<commit_message>
update to chapter 45
</commit_message>
<xml_diff>
--- a/MySQL实战/34到底可不可以使用join？.pptx
+++ b/MySQL实战/34到底可不可以使用join？.pptx
@@ -5,7 +5,7 @@
     <p:sldMasterId id="2147483678" r:id="rId1"/>
   </p:sldMasterIdLst>
   <p:notesMasterIdLst>
-    <p:notesMasterId r:id="rId8"/>
+    <p:notesMasterId r:id="rId10"/>
   </p:notesMasterIdLst>
   <p:sldIdLst>
     <p:sldId id="256" r:id="rId2"/>
@@ -14,6 +14,8 @@
     <p:sldId id="267" r:id="rId5"/>
     <p:sldId id="268" r:id="rId6"/>
     <p:sldId id="269" r:id="rId7"/>
+    <p:sldId id="270" r:id="rId8"/>
+    <p:sldId id="271" r:id="rId9"/>
   </p:sldIdLst>
   <p:sldSz cx="12192000" cy="6858000"/>
   <p:notesSz cx="6858000" cy="9144000"/>
@@ -202,7 +204,7 @@
           <a:p>
             <a:fld id="{A900F2CD-AD8F-46FC-AAAB-A0D218D6826F}" type="datetimeFigureOut">
               <a:rPr lang="zh-CN" altLang="en-US" smtClean="0"/>
-              <a:t>2019/6/10</a:t>
+              <a:t>2019/6/26</a:t>
             </a:fld>
             <a:endParaRPr lang="zh-CN" altLang="en-US"/>
           </a:p>
@@ -890,6 +892,174 @@
 </p:notes>
 </file>
 
+<file path=ppt/notesSlides/notesSlide6.xml><?xml version="1.0" encoding="utf-8"?>
+<p:notes xmlns:a="http://schemas.openxmlformats.org/drawingml/2006/main" xmlns:r="http://schemas.openxmlformats.org/officeDocument/2006/relationships" xmlns:p="http://schemas.openxmlformats.org/presentationml/2006/main">
+  <p:cSld>
+    <p:spTree>
+      <p:nvGrpSpPr>
+        <p:cNvPr id="1" name=""/>
+        <p:cNvGrpSpPr/>
+        <p:nvPr/>
+      </p:nvGrpSpPr>
+      <p:grpSpPr>
+        <a:xfrm>
+          <a:off x="0" y="0"/>
+          <a:ext cx="0" cy="0"/>
+          <a:chOff x="0" y="0"/>
+          <a:chExt cx="0" cy="0"/>
+        </a:xfrm>
+      </p:grpSpPr>
+      <p:sp>
+        <p:nvSpPr>
+          <p:cNvPr id="2" name="幻灯片图像占位符 1"/>
+          <p:cNvSpPr>
+            <a:spLocks noGrp="1" noRot="1" noChangeAspect="1"/>
+          </p:cNvSpPr>
+          <p:nvPr>
+            <p:ph type="sldImg"/>
+          </p:nvPr>
+        </p:nvSpPr>
+        <p:spPr/>
+      </p:sp>
+      <p:sp>
+        <p:nvSpPr>
+          <p:cNvPr id="3" name="备注占位符 2"/>
+          <p:cNvSpPr>
+            <a:spLocks noGrp="1"/>
+          </p:cNvSpPr>
+          <p:nvPr>
+            <p:ph type="body" idx="1"/>
+          </p:nvPr>
+        </p:nvSpPr>
+        <p:spPr/>
+        <p:txBody>
+          <a:bodyPr/>
+          <a:lstStyle/>
+          <a:p>
+            <a:endParaRPr lang="zh-CN" altLang="en-US" dirty="0"/>
+          </a:p>
+        </p:txBody>
+      </p:sp>
+      <p:sp>
+        <p:nvSpPr>
+          <p:cNvPr id="4" name="灯片编号占位符 3"/>
+          <p:cNvSpPr>
+            <a:spLocks noGrp="1"/>
+          </p:cNvSpPr>
+          <p:nvPr>
+            <p:ph type="sldNum" sz="quarter" idx="10"/>
+          </p:nvPr>
+        </p:nvSpPr>
+        <p:spPr/>
+        <p:txBody>
+          <a:bodyPr/>
+          <a:lstStyle/>
+          <a:p>
+            <a:fld id="{36BCCB51-EBEF-4070-8A6F-AD7BCDF80C49}" type="slidenum">
+              <a:rPr lang="zh-CN" altLang="en-US" smtClean="0"/>
+              <a:t>7</a:t>
+            </a:fld>
+            <a:endParaRPr lang="zh-CN" altLang="en-US"/>
+          </a:p>
+        </p:txBody>
+      </p:sp>
+    </p:spTree>
+    <p:extLst>
+      <p:ext uri="{BB962C8B-B14F-4D97-AF65-F5344CB8AC3E}">
+        <p14:creationId xmlns:p14="http://schemas.microsoft.com/office/powerpoint/2010/main" val="1452242182"/>
+      </p:ext>
+    </p:extLst>
+  </p:cSld>
+  <p:clrMapOvr>
+    <a:masterClrMapping/>
+  </p:clrMapOvr>
+</p:notes>
+</file>
+
+<file path=ppt/notesSlides/notesSlide7.xml><?xml version="1.0" encoding="utf-8"?>
+<p:notes xmlns:a="http://schemas.openxmlformats.org/drawingml/2006/main" xmlns:r="http://schemas.openxmlformats.org/officeDocument/2006/relationships" xmlns:p="http://schemas.openxmlformats.org/presentationml/2006/main">
+  <p:cSld>
+    <p:spTree>
+      <p:nvGrpSpPr>
+        <p:cNvPr id="1" name=""/>
+        <p:cNvGrpSpPr/>
+        <p:nvPr/>
+      </p:nvGrpSpPr>
+      <p:grpSpPr>
+        <a:xfrm>
+          <a:off x="0" y="0"/>
+          <a:ext cx="0" cy="0"/>
+          <a:chOff x="0" y="0"/>
+          <a:chExt cx="0" cy="0"/>
+        </a:xfrm>
+      </p:grpSpPr>
+      <p:sp>
+        <p:nvSpPr>
+          <p:cNvPr id="2" name="幻灯片图像占位符 1"/>
+          <p:cNvSpPr>
+            <a:spLocks noGrp="1" noRot="1" noChangeAspect="1"/>
+          </p:cNvSpPr>
+          <p:nvPr>
+            <p:ph type="sldImg"/>
+          </p:nvPr>
+        </p:nvSpPr>
+        <p:spPr/>
+      </p:sp>
+      <p:sp>
+        <p:nvSpPr>
+          <p:cNvPr id="3" name="备注占位符 2"/>
+          <p:cNvSpPr>
+            <a:spLocks noGrp="1"/>
+          </p:cNvSpPr>
+          <p:nvPr>
+            <p:ph type="body" idx="1"/>
+          </p:nvPr>
+        </p:nvSpPr>
+        <p:spPr/>
+        <p:txBody>
+          <a:bodyPr/>
+          <a:lstStyle/>
+          <a:p>
+            <a:endParaRPr lang="zh-CN" altLang="en-US" dirty="0"/>
+          </a:p>
+        </p:txBody>
+      </p:sp>
+      <p:sp>
+        <p:nvSpPr>
+          <p:cNvPr id="4" name="灯片编号占位符 3"/>
+          <p:cNvSpPr>
+            <a:spLocks noGrp="1"/>
+          </p:cNvSpPr>
+          <p:nvPr>
+            <p:ph type="sldNum" sz="quarter" idx="10"/>
+          </p:nvPr>
+        </p:nvSpPr>
+        <p:spPr/>
+        <p:txBody>
+          <a:bodyPr/>
+          <a:lstStyle/>
+          <a:p>
+            <a:fld id="{36BCCB51-EBEF-4070-8A6F-AD7BCDF80C49}" type="slidenum">
+              <a:rPr lang="zh-CN" altLang="en-US" smtClean="0"/>
+              <a:t>8</a:t>
+            </a:fld>
+            <a:endParaRPr lang="zh-CN" altLang="en-US"/>
+          </a:p>
+        </p:txBody>
+      </p:sp>
+    </p:spTree>
+    <p:extLst>
+      <p:ext uri="{BB962C8B-B14F-4D97-AF65-F5344CB8AC3E}">
+        <p14:creationId xmlns:p14="http://schemas.microsoft.com/office/powerpoint/2010/main" val="725917574"/>
+      </p:ext>
+    </p:extLst>
+  </p:cSld>
+  <p:clrMapOvr>
+    <a:masterClrMapping/>
+  </p:clrMapOvr>
+</p:notes>
+</file>
+
 <file path=ppt/slideLayouts/slideLayout1.xml><?xml version="1.0" encoding="utf-8"?>
 <p:sldLayout xmlns:a="http://schemas.openxmlformats.org/drawingml/2006/main" xmlns:r="http://schemas.openxmlformats.org/officeDocument/2006/relationships" xmlns:p="http://schemas.openxmlformats.org/presentationml/2006/main" type="title" preserve="1">
   <p:cSld name="标题幻灯片">
@@ -1076,7 +1246,7 @@
           <a:p>
             <a:fld id="{E396512D-F96B-4538-B91A-F7EB57A489A0}" type="datetimeFigureOut">
               <a:rPr lang="zh-CN" altLang="en-US" smtClean="0"/>
-              <a:t>2019/6/10</a:t>
+              <a:t>2019/6/26</a:t>
             </a:fld>
             <a:endParaRPr lang="zh-CN" altLang="en-US"/>
           </a:p>
@@ -1351,7 +1521,7 @@
           <a:p>
             <a:fld id="{E396512D-F96B-4538-B91A-F7EB57A489A0}" type="datetimeFigureOut">
               <a:rPr lang="zh-CN" altLang="en-US" smtClean="0"/>
-              <a:t>2019/6/10</a:t>
+              <a:t>2019/6/26</a:t>
             </a:fld>
             <a:endParaRPr lang="zh-CN" altLang="en-US"/>
           </a:p>
@@ -1545,7 +1715,7 @@
           <a:p>
             <a:fld id="{E396512D-F96B-4538-B91A-F7EB57A489A0}" type="datetimeFigureOut">
               <a:rPr lang="zh-CN" altLang="en-US" smtClean="0"/>
-              <a:t>2019/6/10</a:t>
+              <a:t>2019/6/26</a:t>
             </a:fld>
             <a:endParaRPr lang="zh-CN" altLang="en-US"/>
           </a:p>
@@ -1818,7 +1988,7 @@
           <a:p>
             <a:fld id="{E396512D-F96B-4538-B91A-F7EB57A489A0}" type="datetimeFigureOut">
               <a:rPr lang="zh-CN" altLang="en-US" smtClean="0"/>
-              <a:t>2019/6/10</a:t>
+              <a:t>2019/6/26</a:t>
             </a:fld>
             <a:endParaRPr lang="zh-CN" altLang="en-US"/>
           </a:p>
@@ -2159,7 +2329,7 @@
           <a:p>
             <a:fld id="{E396512D-F96B-4538-B91A-F7EB57A489A0}" type="datetimeFigureOut">
               <a:rPr lang="zh-CN" altLang="en-US" smtClean="0"/>
-              <a:t>2019/6/10</a:t>
+              <a:t>2019/6/26</a:t>
             </a:fld>
             <a:endParaRPr lang="zh-CN" altLang="en-US"/>
           </a:p>
@@ -2782,7 +2952,7 @@
           <a:p>
             <a:fld id="{E396512D-F96B-4538-B91A-F7EB57A489A0}" type="datetimeFigureOut">
               <a:rPr lang="zh-CN" altLang="en-US" smtClean="0"/>
-              <a:t>2019/6/10</a:t>
+              <a:t>2019/6/26</a:t>
             </a:fld>
             <a:endParaRPr lang="zh-CN" altLang="en-US"/>
           </a:p>
@@ -3642,7 +3812,7 @@
           <a:p>
             <a:fld id="{E396512D-F96B-4538-B91A-F7EB57A489A0}" type="datetimeFigureOut">
               <a:rPr lang="zh-CN" altLang="en-US" smtClean="0"/>
-              <a:t>2019/6/10</a:t>
+              <a:t>2019/6/26</a:t>
             </a:fld>
             <a:endParaRPr lang="zh-CN" altLang="en-US"/>
           </a:p>
@@ -3812,7 +3982,7 @@
           <a:p>
             <a:fld id="{E396512D-F96B-4538-B91A-F7EB57A489A0}" type="datetimeFigureOut">
               <a:rPr lang="zh-CN" altLang="en-US" smtClean="0"/>
-              <a:t>2019/6/10</a:t>
+              <a:t>2019/6/26</a:t>
             </a:fld>
             <a:endParaRPr lang="zh-CN" altLang="en-US"/>
           </a:p>
@@ -3992,7 +4162,7 @@
           <a:p>
             <a:fld id="{E396512D-F96B-4538-B91A-F7EB57A489A0}" type="datetimeFigureOut">
               <a:rPr lang="zh-CN" altLang="en-US" smtClean="0"/>
-              <a:t>2019/6/10</a:t>
+              <a:t>2019/6/26</a:t>
             </a:fld>
             <a:endParaRPr lang="zh-CN" altLang="en-US"/>
           </a:p>
@@ -4162,7 +4332,7 @@
           <a:p>
             <a:fld id="{E396512D-F96B-4538-B91A-F7EB57A489A0}" type="datetimeFigureOut">
               <a:rPr lang="zh-CN" altLang="en-US" smtClean="0"/>
-              <a:t>2019/6/10</a:t>
+              <a:t>2019/6/26</a:t>
             </a:fld>
             <a:endParaRPr lang="zh-CN" altLang="en-US"/>
           </a:p>
@@ -4409,7 +4579,7 @@
           <a:p>
             <a:fld id="{E396512D-F96B-4538-B91A-F7EB57A489A0}" type="datetimeFigureOut">
               <a:rPr lang="zh-CN" altLang="en-US" smtClean="0"/>
-              <a:t>2019/6/10</a:t>
+              <a:t>2019/6/26</a:t>
             </a:fld>
             <a:endParaRPr lang="zh-CN" altLang="en-US"/>
           </a:p>
@@ -4701,7 +4871,7 @@
           <a:p>
             <a:fld id="{E396512D-F96B-4538-B91A-F7EB57A489A0}" type="datetimeFigureOut">
               <a:rPr lang="zh-CN" altLang="en-US" smtClean="0"/>
-              <a:t>2019/6/10</a:t>
+              <a:t>2019/6/26</a:t>
             </a:fld>
             <a:endParaRPr lang="zh-CN" altLang="en-US"/>
           </a:p>
@@ -5145,7 +5315,7 @@
           <a:p>
             <a:fld id="{E396512D-F96B-4538-B91A-F7EB57A489A0}" type="datetimeFigureOut">
               <a:rPr lang="zh-CN" altLang="en-US" smtClean="0"/>
-              <a:t>2019/6/10</a:t>
+              <a:t>2019/6/26</a:t>
             </a:fld>
             <a:endParaRPr lang="zh-CN" altLang="en-US"/>
           </a:p>
@@ -5263,7 +5433,7 @@
           <a:p>
             <a:fld id="{E396512D-F96B-4538-B91A-F7EB57A489A0}" type="datetimeFigureOut">
               <a:rPr lang="zh-CN" altLang="en-US" smtClean="0"/>
-              <a:t>2019/6/10</a:t>
+              <a:t>2019/6/26</a:t>
             </a:fld>
             <a:endParaRPr lang="zh-CN" altLang="en-US"/>
           </a:p>
@@ -5358,7 +5528,7 @@
           <a:p>
             <a:fld id="{E396512D-F96B-4538-B91A-F7EB57A489A0}" type="datetimeFigureOut">
               <a:rPr lang="zh-CN" altLang="en-US" smtClean="0"/>
-              <a:t>2019/6/10</a:t>
+              <a:t>2019/6/26</a:t>
             </a:fld>
             <a:endParaRPr lang="zh-CN" altLang="en-US"/>
           </a:p>
@@ -5637,7 +5807,7 @@
           <a:p>
             <a:fld id="{E396512D-F96B-4538-B91A-F7EB57A489A0}" type="datetimeFigureOut">
               <a:rPr lang="zh-CN" altLang="en-US" smtClean="0"/>
-              <a:t>2019/6/10</a:t>
+              <a:t>2019/6/26</a:t>
             </a:fld>
             <a:endParaRPr lang="zh-CN" altLang="en-US"/>
           </a:p>
@@ -5912,7 +6082,7 @@
           <a:p>
             <a:fld id="{E396512D-F96B-4538-B91A-F7EB57A489A0}" type="datetimeFigureOut">
               <a:rPr lang="zh-CN" altLang="en-US" smtClean="0"/>
-              <a:t>2019/6/10</a:t>
+              <a:t>2019/6/26</a:t>
             </a:fld>
             <a:endParaRPr lang="zh-CN" altLang="en-US"/>
           </a:p>
@@ -6341,7 +6511,7 @@
           <a:p>
             <a:fld id="{E396512D-F96B-4538-B91A-F7EB57A489A0}" type="datetimeFigureOut">
               <a:rPr lang="zh-CN" altLang="en-US" smtClean="0"/>
-              <a:t>2019/6/10</a:t>
+              <a:t>2019/6/26</a:t>
             </a:fld>
             <a:endParaRPr lang="zh-CN" altLang="en-US"/>
           </a:p>
@@ -10923,6 +11093,217 @@
           </a:p>
         </p:txBody>
       </p:sp>
+      <p:sp>
+        <p:nvSpPr>
+          <p:cNvPr id="66" name="矩形 65"/>
+          <p:cNvSpPr/>
+          <p:nvPr/>
+        </p:nvSpPr>
+        <p:spPr>
+          <a:xfrm>
+            <a:off x="1670974" y="4293836"/>
+            <a:ext cx="1117947" cy="553998"/>
+          </a:xfrm>
+          <a:prstGeom prst="rect">
+            <a:avLst/>
+          </a:prstGeom>
+        </p:spPr>
+        <p:txBody>
+          <a:bodyPr wrap="square">
+            <a:spAutoFit/>
+          </a:bodyPr>
+          <a:lstStyle/>
+          <a:p>
+            <a:r>
+              <a:rPr lang="zh-CN" altLang="en-US" sz="1000" dirty="0" smtClean="0">
+                <a:latin typeface="微软雅黑" panose="020B0503020204020204" pitchFamily="34" charset="-122"/>
+                <a:ea typeface="微软雅黑" panose="020B0503020204020204" pitchFamily="34" charset="-122"/>
+              </a:rPr>
+              <a:t>记录</a:t>
+            </a:r>
+            <a:r>
+              <a:rPr lang="en-US" altLang="zh-CN" sz="1000" dirty="0" smtClean="0">
+                <a:latin typeface="微软雅黑" panose="020B0503020204020204" pitchFamily="34" charset="-122"/>
+                <a:ea typeface="微软雅黑" panose="020B0503020204020204" pitchFamily="34" charset="-122"/>
+              </a:rPr>
+              <a:t>R</a:t>
+            </a:r>
+            <a:r>
+              <a:rPr lang="zh-CN" altLang="en-US" sz="1000" dirty="0" smtClean="0">
+                <a:latin typeface="微软雅黑" panose="020B0503020204020204" pitchFamily="34" charset="-122"/>
+                <a:ea typeface="微软雅黑" panose="020B0503020204020204" pitchFamily="34" charset="-122"/>
+              </a:rPr>
+              <a:t>中取出</a:t>
+            </a:r>
+            <a:r>
+              <a:rPr lang="en-US" altLang="zh-CN" sz="1000" dirty="0" smtClean="0">
+                <a:latin typeface="微软雅黑" panose="020B0503020204020204" pitchFamily="34" charset="-122"/>
+                <a:ea typeface="微软雅黑" panose="020B0503020204020204" pitchFamily="34" charset="-122"/>
+              </a:rPr>
+              <a:t>a</a:t>
+            </a:r>
+            <a:r>
+              <a:rPr lang="zh-CN" altLang="en-US" sz="1000" dirty="0" smtClean="0">
+                <a:latin typeface="微软雅黑" panose="020B0503020204020204" pitchFamily="34" charset="-122"/>
+                <a:ea typeface="微软雅黑" panose="020B0503020204020204" pitchFamily="34" charset="-122"/>
+              </a:rPr>
+              <a:t>，</a:t>
+            </a:r>
+            <a:endParaRPr lang="en-US" altLang="zh-CN" sz="1000" dirty="0" smtClean="0">
+              <a:latin typeface="微软雅黑" panose="020B0503020204020204" pitchFamily="34" charset="-122"/>
+              <a:ea typeface="微软雅黑" panose="020B0503020204020204" pitchFamily="34" charset="-122"/>
+            </a:endParaRPr>
+          </a:p>
+          <a:p>
+            <a:r>
+              <a:rPr lang="zh-CN" altLang="en-US" sz="1000" dirty="0" smtClean="0">
+                <a:latin typeface="微软雅黑" panose="020B0503020204020204" pitchFamily="34" charset="-122"/>
+                <a:ea typeface="微软雅黑" panose="020B0503020204020204" pitchFamily="34" charset="-122"/>
+              </a:rPr>
+              <a:t>去</a:t>
+            </a:r>
+            <a:r>
+              <a:rPr lang="en-US" altLang="zh-CN" sz="1000" dirty="0" smtClean="0">
+                <a:latin typeface="微软雅黑" panose="020B0503020204020204" pitchFamily="34" charset="-122"/>
+                <a:ea typeface="微软雅黑" panose="020B0503020204020204" pitchFamily="34" charset="-122"/>
+              </a:rPr>
+              <a:t>t2</a:t>
+            </a:r>
+            <a:r>
+              <a:rPr lang="zh-CN" altLang="en-US" sz="1000" dirty="0" smtClean="0">
+                <a:latin typeface="微软雅黑" panose="020B0503020204020204" pitchFamily="34" charset="-122"/>
+                <a:ea typeface="微软雅黑" panose="020B0503020204020204" pitchFamily="34" charset="-122"/>
+              </a:rPr>
+              <a:t>的索引</a:t>
+            </a:r>
+            <a:r>
+              <a:rPr lang="en-US" altLang="zh-CN" sz="1000" dirty="0" smtClean="0">
+                <a:latin typeface="微软雅黑" panose="020B0503020204020204" pitchFamily="34" charset="-122"/>
+                <a:ea typeface="微软雅黑" panose="020B0503020204020204" pitchFamily="34" charset="-122"/>
+              </a:rPr>
+              <a:t>a</a:t>
+            </a:r>
+            <a:r>
+              <a:rPr lang="zh-CN" altLang="en-US" sz="1000" dirty="0" smtClean="0">
+                <a:latin typeface="微软雅黑" panose="020B0503020204020204" pitchFamily="34" charset="-122"/>
+                <a:ea typeface="微软雅黑" panose="020B0503020204020204" pitchFamily="34" charset="-122"/>
+              </a:rPr>
+              <a:t>里查找记录</a:t>
+            </a:r>
+            <a:endParaRPr lang="en-US" altLang="zh-CN" sz="1000" dirty="0" smtClean="0">
+              <a:latin typeface="微软雅黑" panose="020B0503020204020204" pitchFamily="34" charset="-122"/>
+              <a:ea typeface="微软雅黑" panose="020B0503020204020204" pitchFamily="34" charset="-122"/>
+            </a:endParaRPr>
+          </a:p>
+        </p:txBody>
+      </p:sp>
+      <p:sp>
+        <p:nvSpPr>
+          <p:cNvPr id="68" name="矩形 67"/>
+          <p:cNvSpPr/>
+          <p:nvPr/>
+        </p:nvSpPr>
+        <p:spPr>
+          <a:xfrm>
+            <a:off x="3249297" y="4308445"/>
+            <a:ext cx="1117947" cy="400110"/>
+          </a:xfrm>
+          <a:prstGeom prst="rect">
+            <a:avLst/>
+          </a:prstGeom>
+        </p:spPr>
+        <p:txBody>
+          <a:bodyPr wrap="square">
+            <a:spAutoFit/>
+          </a:bodyPr>
+          <a:lstStyle/>
+          <a:p>
+            <a:r>
+              <a:rPr lang="zh-CN" altLang="en-US" sz="1000" dirty="0" smtClean="0">
+                <a:latin typeface="微软雅黑" panose="020B0503020204020204" pitchFamily="34" charset="-122"/>
+                <a:ea typeface="微软雅黑" panose="020B0503020204020204" pitchFamily="34" charset="-122"/>
+              </a:rPr>
+              <a:t>根据索引</a:t>
+            </a:r>
+            <a:r>
+              <a:rPr lang="en-US" altLang="zh-CN" sz="1000" dirty="0" smtClean="0">
+                <a:latin typeface="微软雅黑" panose="020B0503020204020204" pitchFamily="34" charset="-122"/>
+                <a:ea typeface="微软雅黑" panose="020B0503020204020204" pitchFamily="34" charset="-122"/>
+              </a:rPr>
+              <a:t>a</a:t>
+            </a:r>
+          </a:p>
+          <a:p>
+            <a:r>
+              <a:rPr lang="zh-CN" altLang="en-US" sz="1000" dirty="0" smtClean="0">
+                <a:latin typeface="微软雅黑" panose="020B0503020204020204" pitchFamily="34" charset="-122"/>
+                <a:ea typeface="微软雅黑" panose="020B0503020204020204" pitchFamily="34" charset="-122"/>
+              </a:rPr>
+              <a:t>回表查得记录</a:t>
+            </a:r>
+            <a:r>
+              <a:rPr lang="en-US" altLang="zh-CN" sz="1000" dirty="0" smtClean="0">
+                <a:latin typeface="微软雅黑" panose="020B0503020204020204" pitchFamily="34" charset="-122"/>
+                <a:ea typeface="微软雅黑" panose="020B0503020204020204" pitchFamily="34" charset="-122"/>
+              </a:rPr>
+              <a:t>L</a:t>
+            </a:r>
+            <a:endParaRPr lang="en-US" altLang="zh-CN" sz="1000" dirty="0" smtClean="0">
+              <a:latin typeface="微软雅黑" panose="020B0503020204020204" pitchFamily="34" charset="-122"/>
+              <a:ea typeface="微软雅黑" panose="020B0503020204020204" pitchFamily="34" charset="-122"/>
+            </a:endParaRPr>
+          </a:p>
+        </p:txBody>
+      </p:sp>
+      <p:sp>
+        <p:nvSpPr>
+          <p:cNvPr id="69" name="矩形 68"/>
+          <p:cNvSpPr/>
+          <p:nvPr/>
+        </p:nvSpPr>
+        <p:spPr>
+          <a:xfrm>
+            <a:off x="4928379" y="4257150"/>
+            <a:ext cx="843772" cy="707886"/>
+          </a:xfrm>
+          <a:prstGeom prst="rect">
+            <a:avLst/>
+          </a:prstGeom>
+        </p:spPr>
+        <p:txBody>
+          <a:bodyPr wrap="square">
+            <a:spAutoFit/>
+          </a:bodyPr>
+          <a:lstStyle/>
+          <a:p>
+            <a:r>
+              <a:rPr lang="zh-CN" altLang="en-US" sz="1000" dirty="0" smtClean="0">
+                <a:latin typeface="微软雅黑" panose="020B0503020204020204" pitchFamily="34" charset="-122"/>
+                <a:ea typeface="微软雅黑" panose="020B0503020204020204" pitchFamily="34" charset="-122"/>
+              </a:rPr>
+              <a:t>与</a:t>
+            </a:r>
+            <a:r>
+              <a:rPr lang="en-US" altLang="zh-CN" sz="1000" dirty="0" smtClean="0">
+                <a:latin typeface="微软雅黑" panose="020B0503020204020204" pitchFamily="34" charset="-122"/>
+                <a:ea typeface="微软雅黑" panose="020B0503020204020204" pitchFamily="34" charset="-122"/>
+              </a:rPr>
+              <a:t>t1</a:t>
+            </a:r>
+            <a:r>
+              <a:rPr lang="zh-CN" altLang="en-US" sz="1000" dirty="0" smtClean="0">
+                <a:latin typeface="微软雅黑" panose="020B0503020204020204" pitchFamily="34" charset="-122"/>
+                <a:ea typeface="微软雅黑" panose="020B0503020204020204" pitchFamily="34" charset="-122"/>
+              </a:rPr>
+              <a:t>的记录组成一行，成为结果集一部分。</a:t>
+            </a:r>
+            <a:endParaRPr lang="en-US" altLang="zh-CN" sz="1000" dirty="0" smtClean="0">
+              <a:latin typeface="微软雅黑" panose="020B0503020204020204" pitchFamily="34" charset="-122"/>
+              <a:ea typeface="微软雅黑" panose="020B0503020204020204" pitchFamily="34" charset="-122"/>
+            </a:endParaRPr>
+          </a:p>
+        </p:txBody>
+      </p:sp>
     </p:spTree>
     <p:extLst>
       <p:ext uri="{BB962C8B-B14F-4D97-AF65-F5344CB8AC3E}">
@@ -22008,6 +22389,2567 @@
     <p:extLst>
       <p:ext uri="{BB962C8B-B14F-4D97-AF65-F5344CB8AC3E}">
         <p14:creationId xmlns:p14="http://schemas.microsoft.com/office/powerpoint/2010/main" val="2449019465"/>
+      </p:ext>
+    </p:extLst>
+  </p:cSld>
+  <p:clrMapOvr>
+    <a:masterClrMapping/>
+  </p:clrMapOvr>
+  <p:timing>
+    <p:tnLst>
+      <p:par>
+        <p:cTn id="1" dur="indefinite" restart="never" nodeType="tmRoot"/>
+      </p:par>
+    </p:tnLst>
+  </p:timing>
+</p:sld>
+</file>
+
+<file path=ppt/slides/slide7.xml><?xml version="1.0" encoding="utf-8"?>
+<p:sld xmlns:a="http://schemas.openxmlformats.org/drawingml/2006/main" xmlns:r="http://schemas.openxmlformats.org/officeDocument/2006/relationships" xmlns:p="http://schemas.openxmlformats.org/presentationml/2006/main">
+  <p:cSld>
+    <p:spTree>
+      <p:nvGrpSpPr>
+        <p:cNvPr id="1" name=""/>
+        <p:cNvGrpSpPr/>
+        <p:nvPr/>
+      </p:nvGrpSpPr>
+      <p:grpSpPr>
+        <a:xfrm>
+          <a:off x="0" y="0"/>
+          <a:ext cx="0" cy="0"/>
+          <a:chOff x="0" y="0"/>
+          <a:chExt cx="0" cy="0"/>
+        </a:xfrm>
+      </p:grpSpPr>
+      <p:sp>
+        <p:nvSpPr>
+          <p:cNvPr id="2" name="标题 1"/>
+          <p:cNvSpPr>
+            <a:spLocks noGrp="1"/>
+          </p:cNvSpPr>
+          <p:nvPr>
+            <p:ph type="title"/>
+          </p:nvPr>
+        </p:nvSpPr>
+        <p:spPr>
+          <a:xfrm>
+            <a:off x="114300" y="152400"/>
+            <a:ext cx="11149057" cy="602359"/>
+          </a:xfrm>
+        </p:spPr>
+        <p:txBody>
+          <a:bodyPr/>
+          <a:lstStyle/>
+          <a:p>
+            <a:r>
+              <a:rPr lang="en-US" altLang="zh-CN" sz="3200" b="1" dirty="0">
+                <a:latin typeface="微软雅黑" panose="020B0503020204020204" pitchFamily="34" charset="-122"/>
+                <a:ea typeface="微软雅黑" panose="020B0503020204020204" pitchFamily="34" charset="-122"/>
+              </a:rPr>
+              <a:t>34 | </a:t>
+            </a:r>
+            <a:r>
+              <a:rPr lang="zh-CN" altLang="en-US" sz="3200" b="1" dirty="0">
+                <a:latin typeface="微软雅黑" panose="020B0503020204020204" pitchFamily="34" charset="-122"/>
+                <a:ea typeface="微软雅黑" panose="020B0503020204020204" pitchFamily="34" charset="-122"/>
+              </a:rPr>
+              <a:t>到底可不可以使用</a:t>
+            </a:r>
+            <a:r>
+              <a:rPr lang="en-US" altLang="zh-CN" sz="3200" b="1" dirty="0">
+                <a:latin typeface="微软雅黑" panose="020B0503020204020204" pitchFamily="34" charset="-122"/>
+                <a:ea typeface="微软雅黑" panose="020B0503020204020204" pitchFamily="34" charset="-122"/>
+              </a:rPr>
+              <a:t>join</a:t>
+            </a:r>
+            <a:r>
+              <a:rPr lang="zh-CN" altLang="en-US" sz="3200" b="1" dirty="0">
+                <a:latin typeface="微软雅黑" panose="020B0503020204020204" pitchFamily="34" charset="-122"/>
+                <a:ea typeface="微软雅黑" panose="020B0503020204020204" pitchFamily="34" charset="-122"/>
+              </a:rPr>
+              <a:t>？</a:t>
+            </a:r>
+          </a:p>
+        </p:txBody>
+      </p:sp>
+      <p:sp>
+        <p:nvSpPr>
+          <p:cNvPr id="31" name="文本框 30"/>
+          <p:cNvSpPr txBox="1"/>
+          <p:nvPr/>
+        </p:nvSpPr>
+        <p:spPr>
+          <a:xfrm>
+            <a:off x="117196" y="754759"/>
+            <a:ext cx="8314007" cy="369332"/>
+          </a:xfrm>
+          <a:prstGeom prst="rect">
+            <a:avLst/>
+          </a:prstGeom>
+          <a:noFill/>
+        </p:spPr>
+        <p:txBody>
+          <a:bodyPr wrap="none">
+            <a:spAutoFit/>
+            <a:scene3d>
+              <a:camera prst="orthographicFront"/>
+              <a:lightRig rig="harsh" dir="t"/>
+            </a:scene3d>
+            <a:sp3d extrusionH="57150" prstMaterial="matte">
+              <a:bevelT w="63500" h="12700" prst="angle"/>
+              <a:contourClr>
+                <a:schemeClr val="bg1">
+                  <a:lumMod val="65000"/>
+                </a:schemeClr>
+              </a:contourClr>
+            </a:sp3d>
+          </a:bodyPr>
+          <a:lstStyle/>
+          <a:p>
+            <a:pPr>
+              <a:defRPr/>
+            </a:pPr>
+            <a:r>
+              <a:rPr lang="zh-CN" altLang="en-US" b="1" dirty="0" smtClean="0">
+                <a:ln/>
+                <a:solidFill>
+                  <a:srgbClr val="4FD1FF"/>
+                </a:solidFill>
+                <a:latin typeface="微软雅黑" panose="020B0503020204020204" pitchFamily="34" charset="-122"/>
+                <a:ea typeface="微软雅黑" panose="020B0503020204020204" pitchFamily="34" charset="-122"/>
+              </a:rPr>
+              <a:t>问题：</a:t>
+            </a:r>
+            <a:r>
+              <a:rPr lang="en-US" altLang="zh-CN" b="1" dirty="0" smtClean="0">
+                <a:ln/>
+                <a:solidFill>
+                  <a:srgbClr val="4FD1FF"/>
+                </a:solidFill>
+                <a:latin typeface="微软雅黑" panose="020B0503020204020204" pitchFamily="34" charset="-122"/>
+                <a:ea typeface="微软雅黑" panose="020B0503020204020204" pitchFamily="34" charset="-122"/>
+              </a:rPr>
+              <a:t>left join</a:t>
+            </a:r>
+            <a:r>
+              <a:rPr lang="zh-CN" altLang="en-US" b="1" dirty="0" smtClean="0">
+                <a:ln/>
+                <a:solidFill>
+                  <a:srgbClr val="4FD1FF"/>
+                </a:solidFill>
+                <a:latin typeface="微软雅黑" panose="020B0503020204020204" pitchFamily="34" charset="-122"/>
+                <a:ea typeface="微软雅黑" panose="020B0503020204020204" pitchFamily="34" charset="-122"/>
+              </a:rPr>
+              <a:t>的左边的表一定是驱动表吗？</a:t>
+            </a:r>
+            <a:r>
+              <a:rPr lang="en-US" altLang="zh-CN" b="1" dirty="0" smtClean="0">
+                <a:ln/>
+                <a:solidFill>
+                  <a:srgbClr val="4FD1FF"/>
+                </a:solidFill>
+                <a:latin typeface="微软雅黑" panose="020B0503020204020204" pitchFamily="34" charset="-122"/>
+                <a:ea typeface="微软雅黑" panose="020B0503020204020204" pitchFamily="34" charset="-122"/>
+              </a:rPr>
+              <a:t>join</a:t>
+            </a:r>
+            <a:r>
+              <a:rPr lang="zh-CN" altLang="en-US" b="1" dirty="0" smtClean="0">
+                <a:ln/>
+                <a:solidFill>
+                  <a:srgbClr val="4FD1FF"/>
+                </a:solidFill>
+                <a:latin typeface="微软雅黑" panose="020B0503020204020204" pitchFamily="34" charset="-122"/>
+                <a:ea typeface="微软雅黑" panose="020B0503020204020204" pitchFamily="34" charset="-122"/>
+              </a:rPr>
+              <a:t>的时候</a:t>
+            </a:r>
+            <a:r>
+              <a:rPr lang="en-US" altLang="zh-CN" b="1" dirty="0" smtClean="0">
+                <a:ln/>
+                <a:solidFill>
+                  <a:srgbClr val="4FD1FF"/>
+                </a:solidFill>
+                <a:latin typeface="微软雅黑" panose="020B0503020204020204" pitchFamily="34" charset="-122"/>
+                <a:ea typeface="微软雅黑" panose="020B0503020204020204" pitchFamily="34" charset="-122"/>
+              </a:rPr>
+              <a:t>on</a:t>
+            </a:r>
+            <a:r>
+              <a:rPr lang="zh-CN" altLang="en-US" b="1" dirty="0" smtClean="0">
+                <a:ln/>
+                <a:solidFill>
+                  <a:srgbClr val="4FD1FF"/>
+                </a:solidFill>
+                <a:latin typeface="微软雅黑" panose="020B0503020204020204" pitchFamily="34" charset="-122"/>
+                <a:ea typeface="微软雅黑" panose="020B0503020204020204" pitchFamily="34" charset="-122"/>
+              </a:rPr>
+              <a:t>和</a:t>
+            </a:r>
+            <a:r>
+              <a:rPr lang="en-US" altLang="zh-CN" b="1" dirty="0" smtClean="0">
+                <a:ln/>
+                <a:solidFill>
+                  <a:srgbClr val="4FD1FF"/>
+                </a:solidFill>
+                <a:latin typeface="微软雅黑" panose="020B0503020204020204" pitchFamily="34" charset="-122"/>
+                <a:ea typeface="微软雅黑" panose="020B0503020204020204" pitchFamily="34" charset="-122"/>
+              </a:rPr>
+              <a:t>where</a:t>
+            </a:r>
+            <a:r>
+              <a:rPr lang="zh-CN" altLang="en-US" b="1" dirty="0" smtClean="0">
+                <a:ln/>
+                <a:solidFill>
+                  <a:srgbClr val="4FD1FF"/>
+                </a:solidFill>
+                <a:latin typeface="微软雅黑" panose="020B0503020204020204" pitchFamily="34" charset="-122"/>
+                <a:ea typeface="微软雅黑" panose="020B0503020204020204" pitchFamily="34" charset="-122"/>
+              </a:rPr>
+              <a:t>应该怎么用</a:t>
+            </a:r>
+            <a:endParaRPr lang="en-US" altLang="zh-CN" b="1" dirty="0" smtClean="0">
+              <a:ln/>
+              <a:solidFill>
+                <a:srgbClr val="4FD1FF"/>
+              </a:solidFill>
+              <a:latin typeface="微软雅黑" panose="020B0503020204020204" pitchFamily="34" charset="-122"/>
+              <a:ea typeface="微软雅黑" panose="020B0503020204020204" pitchFamily="34" charset="-122"/>
+            </a:endParaRPr>
+          </a:p>
+        </p:txBody>
+      </p:sp>
+      <p:sp>
+        <p:nvSpPr>
+          <p:cNvPr id="75" name="矩形 74"/>
+          <p:cNvSpPr/>
+          <p:nvPr/>
+        </p:nvSpPr>
+        <p:spPr>
+          <a:xfrm>
+            <a:off x="114300" y="1258176"/>
+            <a:ext cx="11856027" cy="954107"/>
+          </a:xfrm>
+          <a:prstGeom prst="rect">
+            <a:avLst/>
+          </a:prstGeom>
+        </p:spPr>
+        <p:txBody>
+          <a:bodyPr wrap="square">
+            <a:spAutoFit/>
+          </a:bodyPr>
+          <a:lstStyle/>
+          <a:p>
+            <a:r>
+              <a:rPr lang="en-US" altLang="zh-CN" sz="1400" dirty="0">
+                <a:solidFill>
+                  <a:srgbClr val="92D050"/>
+                </a:solidFill>
+                <a:latin typeface="微软雅黑" panose="020B0503020204020204" pitchFamily="34" charset="-122"/>
+                <a:ea typeface="微软雅黑" panose="020B0503020204020204" pitchFamily="34" charset="-122"/>
+              </a:rPr>
+              <a:t>create table a(f1 </a:t>
+            </a:r>
+            <a:r>
+              <a:rPr lang="en-US" altLang="zh-CN" sz="1400" dirty="0" err="1">
+                <a:solidFill>
+                  <a:srgbClr val="92D050"/>
+                </a:solidFill>
+                <a:latin typeface="微软雅黑" panose="020B0503020204020204" pitchFamily="34" charset="-122"/>
+                <a:ea typeface="微软雅黑" panose="020B0503020204020204" pitchFamily="34" charset="-122"/>
+              </a:rPr>
+              <a:t>int</a:t>
+            </a:r>
+            <a:r>
+              <a:rPr lang="en-US" altLang="zh-CN" sz="1400" dirty="0">
+                <a:solidFill>
+                  <a:srgbClr val="92D050"/>
+                </a:solidFill>
+                <a:latin typeface="微软雅黑" panose="020B0503020204020204" pitchFamily="34" charset="-122"/>
+                <a:ea typeface="微软雅黑" panose="020B0503020204020204" pitchFamily="34" charset="-122"/>
+              </a:rPr>
+              <a:t>, f2 </a:t>
+            </a:r>
+            <a:r>
+              <a:rPr lang="en-US" altLang="zh-CN" sz="1400" dirty="0" err="1">
+                <a:solidFill>
+                  <a:srgbClr val="92D050"/>
+                </a:solidFill>
+                <a:latin typeface="微软雅黑" panose="020B0503020204020204" pitchFamily="34" charset="-122"/>
+                <a:ea typeface="微软雅黑" panose="020B0503020204020204" pitchFamily="34" charset="-122"/>
+              </a:rPr>
+              <a:t>int</a:t>
+            </a:r>
+            <a:r>
+              <a:rPr lang="en-US" altLang="zh-CN" sz="1400" dirty="0">
+                <a:solidFill>
+                  <a:srgbClr val="92D050"/>
+                </a:solidFill>
+                <a:latin typeface="微软雅黑" panose="020B0503020204020204" pitchFamily="34" charset="-122"/>
+                <a:ea typeface="微软雅黑" panose="020B0503020204020204" pitchFamily="34" charset="-122"/>
+              </a:rPr>
+              <a:t>, index(f1))engine=</a:t>
+            </a:r>
+            <a:r>
+              <a:rPr lang="en-US" altLang="zh-CN" sz="1400" dirty="0" err="1">
+                <a:solidFill>
+                  <a:srgbClr val="92D050"/>
+                </a:solidFill>
+                <a:latin typeface="微软雅黑" panose="020B0503020204020204" pitchFamily="34" charset="-122"/>
+                <a:ea typeface="微软雅黑" panose="020B0503020204020204" pitchFamily="34" charset="-122"/>
+              </a:rPr>
+              <a:t>innodb</a:t>
+            </a:r>
+            <a:r>
+              <a:rPr lang="en-US" altLang="zh-CN" sz="1400" dirty="0">
+                <a:solidFill>
+                  <a:srgbClr val="92D050"/>
+                </a:solidFill>
+                <a:latin typeface="微软雅黑" panose="020B0503020204020204" pitchFamily="34" charset="-122"/>
+                <a:ea typeface="微软雅黑" panose="020B0503020204020204" pitchFamily="34" charset="-122"/>
+              </a:rPr>
+              <a:t>;</a:t>
+            </a:r>
+          </a:p>
+          <a:p>
+            <a:r>
+              <a:rPr lang="en-US" altLang="zh-CN" sz="1400" dirty="0">
+                <a:solidFill>
+                  <a:srgbClr val="92D050"/>
+                </a:solidFill>
+                <a:latin typeface="微软雅黑" panose="020B0503020204020204" pitchFamily="34" charset="-122"/>
+                <a:ea typeface="微软雅黑" panose="020B0503020204020204" pitchFamily="34" charset="-122"/>
+              </a:rPr>
+              <a:t>create table b(f1 </a:t>
+            </a:r>
+            <a:r>
+              <a:rPr lang="en-US" altLang="zh-CN" sz="1400" dirty="0" err="1">
+                <a:solidFill>
+                  <a:srgbClr val="92D050"/>
+                </a:solidFill>
+                <a:latin typeface="微软雅黑" panose="020B0503020204020204" pitchFamily="34" charset="-122"/>
+                <a:ea typeface="微软雅黑" panose="020B0503020204020204" pitchFamily="34" charset="-122"/>
+              </a:rPr>
+              <a:t>int</a:t>
+            </a:r>
+            <a:r>
+              <a:rPr lang="en-US" altLang="zh-CN" sz="1400" dirty="0">
+                <a:solidFill>
+                  <a:srgbClr val="92D050"/>
+                </a:solidFill>
+                <a:latin typeface="微软雅黑" panose="020B0503020204020204" pitchFamily="34" charset="-122"/>
+                <a:ea typeface="微软雅黑" panose="020B0503020204020204" pitchFamily="34" charset="-122"/>
+              </a:rPr>
+              <a:t>, f2 </a:t>
+            </a:r>
+            <a:r>
+              <a:rPr lang="en-US" altLang="zh-CN" sz="1400" dirty="0" err="1">
+                <a:solidFill>
+                  <a:srgbClr val="92D050"/>
+                </a:solidFill>
+                <a:latin typeface="微软雅黑" panose="020B0503020204020204" pitchFamily="34" charset="-122"/>
+                <a:ea typeface="微软雅黑" panose="020B0503020204020204" pitchFamily="34" charset="-122"/>
+              </a:rPr>
+              <a:t>int</a:t>
+            </a:r>
+            <a:r>
+              <a:rPr lang="en-US" altLang="zh-CN" sz="1400" dirty="0">
+                <a:solidFill>
+                  <a:srgbClr val="92D050"/>
+                </a:solidFill>
+                <a:latin typeface="微软雅黑" panose="020B0503020204020204" pitchFamily="34" charset="-122"/>
+                <a:ea typeface="微软雅黑" panose="020B0503020204020204" pitchFamily="34" charset="-122"/>
+              </a:rPr>
+              <a:t>)engine=</a:t>
+            </a:r>
+            <a:r>
+              <a:rPr lang="en-US" altLang="zh-CN" sz="1400" dirty="0" err="1">
+                <a:solidFill>
+                  <a:srgbClr val="92D050"/>
+                </a:solidFill>
+                <a:latin typeface="微软雅黑" panose="020B0503020204020204" pitchFamily="34" charset="-122"/>
+                <a:ea typeface="微软雅黑" panose="020B0503020204020204" pitchFamily="34" charset="-122"/>
+              </a:rPr>
+              <a:t>innodb</a:t>
+            </a:r>
+            <a:r>
+              <a:rPr lang="en-US" altLang="zh-CN" sz="1400" dirty="0">
+                <a:solidFill>
+                  <a:srgbClr val="92D050"/>
+                </a:solidFill>
+                <a:latin typeface="微软雅黑" panose="020B0503020204020204" pitchFamily="34" charset="-122"/>
+                <a:ea typeface="微软雅黑" panose="020B0503020204020204" pitchFamily="34" charset="-122"/>
+              </a:rPr>
+              <a:t>;</a:t>
+            </a:r>
+          </a:p>
+          <a:p>
+            <a:r>
+              <a:rPr lang="en-US" altLang="zh-CN" sz="1400" dirty="0">
+                <a:solidFill>
+                  <a:srgbClr val="92D050"/>
+                </a:solidFill>
+                <a:latin typeface="微软雅黑" panose="020B0503020204020204" pitchFamily="34" charset="-122"/>
+                <a:ea typeface="微软雅黑" panose="020B0503020204020204" pitchFamily="34" charset="-122"/>
+              </a:rPr>
+              <a:t>insert into a values(1,1),(2,2),(3,3),(4,4),(5,5),(6,6);</a:t>
+            </a:r>
+          </a:p>
+          <a:p>
+            <a:r>
+              <a:rPr lang="en-US" altLang="zh-CN" sz="1400" dirty="0">
+                <a:solidFill>
+                  <a:srgbClr val="92D050"/>
+                </a:solidFill>
+                <a:latin typeface="微软雅黑" panose="020B0503020204020204" pitchFamily="34" charset="-122"/>
+                <a:ea typeface="微软雅黑" panose="020B0503020204020204" pitchFamily="34" charset="-122"/>
+              </a:rPr>
+              <a:t>insert into b values(3,3),(4,4),(5,5),(6,6),(7,7),(8,8);</a:t>
+            </a:r>
+          </a:p>
+        </p:txBody>
+      </p:sp>
+      <p:pic>
+        <p:nvPicPr>
+          <p:cNvPr id="3" name="图片 2"/>
+          <p:cNvPicPr>
+            <a:picLocks noChangeAspect="1"/>
+          </p:cNvPicPr>
+          <p:nvPr/>
+        </p:nvPicPr>
+        <p:blipFill>
+          <a:blip r:embed="rId3" cstate="print">
+            <a:extLst>
+              <a:ext uri="{28A0092B-C50C-407E-A947-70E740481C1C}">
+                <a14:useLocalDpi xmlns:a14="http://schemas.microsoft.com/office/drawing/2010/main" val="0"/>
+              </a:ext>
+            </a:extLst>
+          </a:blip>
+          <a:stretch>
+            <a:fillRect/>
+          </a:stretch>
+        </p:blipFill>
+        <p:spPr>
+          <a:xfrm>
+            <a:off x="7920092" y="127677"/>
+            <a:ext cx="3524172" cy="2348012"/>
+          </a:xfrm>
+          <a:prstGeom prst="rect">
+            <a:avLst/>
+          </a:prstGeom>
+        </p:spPr>
+      </p:pic>
+      <p:sp>
+        <p:nvSpPr>
+          <p:cNvPr id="9" name="矩形标注 8"/>
+          <p:cNvSpPr/>
+          <p:nvPr/>
+        </p:nvSpPr>
+        <p:spPr>
+          <a:xfrm>
+            <a:off x="9682178" y="416373"/>
+            <a:ext cx="2509822" cy="534856"/>
+          </a:xfrm>
+          <a:prstGeom prst="wedgeRectCallout">
+            <a:avLst>
+              <a:gd name="adj1" fmla="val -63141"/>
+              <a:gd name="adj2" fmla="val -15694"/>
+            </a:avLst>
+          </a:prstGeom>
+          <a:solidFill>
+            <a:schemeClr val="tx1">
+              <a:lumMod val="85000"/>
+              <a:alpha val="50000"/>
+            </a:schemeClr>
+          </a:solidFill>
+          <a:ln>
+            <a:noFill/>
+          </a:ln>
+        </p:spPr>
+        <p:style>
+          <a:lnRef idx="0">
+            <a:scrgbClr r="0" g="0" b="0"/>
+          </a:lnRef>
+          <a:fillRef idx="0">
+            <a:scrgbClr r="0" g="0" b="0"/>
+          </a:fillRef>
+          <a:effectRef idx="0">
+            <a:scrgbClr r="0" g="0" b="0"/>
+          </a:effectRef>
+          <a:fontRef idx="minor">
+            <a:schemeClr val="lt1"/>
+          </a:fontRef>
+        </p:style>
+        <p:txBody>
+          <a:bodyPr rtlCol="0" anchor="ctr"/>
+          <a:lstStyle/>
+          <a:p>
+            <a:r>
+              <a:rPr lang="zh-CN" altLang="en-US" sz="1200" dirty="0">
+                <a:latin typeface="微软雅黑" panose="020B0503020204020204" pitchFamily="34" charset="-122"/>
+                <a:ea typeface="微软雅黑" panose="020B0503020204020204" pitchFamily="34" charset="-122"/>
+              </a:rPr>
+              <a:t>把</a:t>
+            </a:r>
+            <a:r>
+              <a:rPr lang="zh-CN" altLang="en-US" sz="1200" dirty="0" smtClean="0">
+                <a:latin typeface="微软雅黑" panose="020B0503020204020204" pitchFamily="34" charset="-122"/>
+                <a:ea typeface="微软雅黑" panose="020B0503020204020204" pitchFamily="34" charset="-122"/>
+              </a:rPr>
+              <a:t>条件写在</a:t>
+            </a:r>
+            <a:r>
+              <a:rPr lang="en-US" altLang="zh-CN" sz="1200" dirty="0" smtClean="0">
+                <a:latin typeface="微软雅黑" panose="020B0503020204020204" pitchFamily="34" charset="-122"/>
+                <a:ea typeface="微软雅黑" panose="020B0503020204020204" pitchFamily="34" charset="-122"/>
+              </a:rPr>
+              <a:t>on</a:t>
+            </a:r>
+            <a:r>
+              <a:rPr lang="zh-CN" altLang="en-US" sz="1200" dirty="0" smtClean="0">
+                <a:latin typeface="微软雅黑" panose="020B0503020204020204" pitchFamily="34" charset="-122"/>
+                <a:ea typeface="微软雅黑" panose="020B0503020204020204" pitchFamily="34" charset="-122"/>
+              </a:rPr>
+              <a:t>中，</a:t>
+            </a:r>
+            <a:r>
+              <a:rPr lang="en-US" altLang="zh-CN" sz="1200" dirty="0" smtClean="0">
+                <a:latin typeface="微软雅黑" panose="020B0503020204020204" pitchFamily="34" charset="-122"/>
+                <a:ea typeface="微软雅黑" panose="020B0503020204020204" pitchFamily="34" charset="-122"/>
+              </a:rPr>
+              <a:t>a</a:t>
+            </a:r>
+            <a:r>
+              <a:rPr lang="zh-CN" altLang="en-US" sz="1200" dirty="0" smtClean="0">
+                <a:latin typeface="微软雅黑" panose="020B0503020204020204" pitchFamily="34" charset="-122"/>
+                <a:ea typeface="微软雅黑" panose="020B0503020204020204" pitchFamily="34" charset="-122"/>
+              </a:rPr>
+              <a:t>做全表扫描，</a:t>
+            </a:r>
+            <a:r>
+              <a:rPr lang="en-US" altLang="zh-CN" sz="1200" dirty="0" smtClean="0">
+                <a:latin typeface="微软雅黑" panose="020B0503020204020204" pitchFamily="34" charset="-122"/>
+                <a:ea typeface="微软雅黑" panose="020B0503020204020204" pitchFamily="34" charset="-122"/>
+              </a:rPr>
+              <a:t>b</a:t>
+            </a:r>
+            <a:r>
+              <a:rPr lang="zh-CN" altLang="en-US" sz="1200" dirty="0" smtClean="0">
+                <a:latin typeface="微软雅黑" panose="020B0503020204020204" pitchFamily="34" charset="-122"/>
+                <a:ea typeface="微软雅黑" panose="020B0503020204020204" pitchFamily="34" charset="-122"/>
+              </a:rPr>
+              <a:t>中无匹配的记录则填写为</a:t>
+            </a:r>
+            <a:r>
+              <a:rPr lang="en-US" altLang="zh-CN" sz="1200" dirty="0" smtClean="0">
+                <a:latin typeface="微软雅黑" panose="020B0503020204020204" pitchFamily="34" charset="-122"/>
+                <a:ea typeface="微软雅黑" panose="020B0503020204020204" pitchFamily="34" charset="-122"/>
+              </a:rPr>
+              <a:t>NULL</a:t>
+            </a:r>
+            <a:endParaRPr lang="en-US" altLang="zh-CN" sz="1200" dirty="0">
+              <a:solidFill>
+                <a:srgbClr val="FFFF00"/>
+              </a:solidFill>
+            </a:endParaRPr>
+          </a:p>
+        </p:txBody>
+      </p:sp>
+      <p:sp>
+        <p:nvSpPr>
+          <p:cNvPr id="10" name="矩形标注 9"/>
+          <p:cNvSpPr/>
+          <p:nvPr/>
+        </p:nvSpPr>
+        <p:spPr>
+          <a:xfrm>
+            <a:off x="9682178" y="1727013"/>
+            <a:ext cx="2509822" cy="534856"/>
+          </a:xfrm>
+          <a:prstGeom prst="wedgeRectCallout">
+            <a:avLst>
+              <a:gd name="adj1" fmla="val -63141"/>
+              <a:gd name="adj2" fmla="val -15694"/>
+            </a:avLst>
+          </a:prstGeom>
+          <a:solidFill>
+            <a:schemeClr val="tx1">
+              <a:lumMod val="85000"/>
+              <a:alpha val="50000"/>
+            </a:schemeClr>
+          </a:solidFill>
+          <a:ln>
+            <a:noFill/>
+          </a:ln>
+        </p:spPr>
+        <p:style>
+          <a:lnRef idx="0">
+            <a:scrgbClr r="0" g="0" b="0"/>
+          </a:lnRef>
+          <a:fillRef idx="0">
+            <a:scrgbClr r="0" g="0" b="0"/>
+          </a:fillRef>
+          <a:effectRef idx="0">
+            <a:scrgbClr r="0" g="0" b="0"/>
+          </a:effectRef>
+          <a:fontRef idx="minor">
+            <a:schemeClr val="lt1"/>
+          </a:fontRef>
+        </p:style>
+        <p:txBody>
+          <a:bodyPr rtlCol="0" anchor="ctr"/>
+          <a:lstStyle/>
+          <a:p>
+            <a:r>
+              <a:rPr lang="zh-CN" altLang="en-US" sz="1200" dirty="0" smtClean="0">
+                <a:latin typeface="微软雅黑" panose="020B0503020204020204" pitchFamily="34" charset="-122"/>
+                <a:ea typeface="微软雅黑" panose="020B0503020204020204" pitchFamily="34" charset="-122"/>
+              </a:rPr>
+              <a:t>把条件写在</a:t>
+            </a:r>
+            <a:r>
+              <a:rPr lang="en-US" altLang="zh-CN" sz="1200" dirty="0" smtClean="0">
+                <a:latin typeface="微软雅黑" panose="020B0503020204020204" pitchFamily="34" charset="-122"/>
+                <a:ea typeface="微软雅黑" panose="020B0503020204020204" pitchFamily="34" charset="-122"/>
+              </a:rPr>
+              <a:t>where</a:t>
+            </a:r>
+            <a:r>
+              <a:rPr lang="zh-CN" altLang="en-US" sz="1200" dirty="0" smtClean="0">
+                <a:latin typeface="微软雅黑" panose="020B0503020204020204" pitchFamily="34" charset="-122"/>
+                <a:ea typeface="微软雅黑" panose="020B0503020204020204" pitchFamily="34" charset="-122"/>
+              </a:rPr>
+              <a:t>中，可以用</a:t>
+            </a:r>
+            <a:r>
+              <a:rPr lang="en-US" altLang="zh-CN" sz="1200" dirty="0" smtClean="0">
+                <a:latin typeface="微软雅黑" panose="020B0503020204020204" pitchFamily="34" charset="-122"/>
+                <a:ea typeface="微软雅黑" panose="020B0503020204020204" pitchFamily="34" charset="-122"/>
+              </a:rPr>
+              <a:t>where</a:t>
+            </a:r>
+            <a:r>
+              <a:rPr lang="zh-CN" altLang="en-US" sz="1200" dirty="0" smtClean="0">
+                <a:latin typeface="微软雅黑" panose="020B0503020204020204" pitchFamily="34" charset="-122"/>
+                <a:ea typeface="微软雅黑" panose="020B0503020204020204" pitchFamily="34" charset="-122"/>
+              </a:rPr>
+              <a:t>过滤出不满足的</a:t>
+            </a:r>
+            <a:r>
+              <a:rPr lang="en-US" altLang="zh-CN" sz="1200" dirty="0" smtClean="0">
+                <a:latin typeface="微软雅黑" panose="020B0503020204020204" pitchFamily="34" charset="-122"/>
+                <a:ea typeface="微软雅黑" panose="020B0503020204020204" pitchFamily="34" charset="-122"/>
+              </a:rPr>
+              <a:t>a</a:t>
+            </a:r>
+            <a:r>
+              <a:rPr lang="zh-CN" altLang="en-US" sz="1200" dirty="0" smtClean="0">
+                <a:latin typeface="微软雅黑" panose="020B0503020204020204" pitchFamily="34" charset="-122"/>
+                <a:ea typeface="微软雅黑" panose="020B0503020204020204" pitchFamily="34" charset="-122"/>
+              </a:rPr>
+              <a:t>的记录</a:t>
+            </a:r>
+            <a:endParaRPr lang="en-US" altLang="zh-CN" sz="1200" dirty="0">
+              <a:solidFill>
+                <a:srgbClr val="FFFF00"/>
+              </a:solidFill>
+            </a:endParaRPr>
+          </a:p>
+        </p:txBody>
+      </p:sp>
+      <p:pic>
+        <p:nvPicPr>
+          <p:cNvPr id="4" name="图片 3"/>
+          <p:cNvPicPr>
+            <a:picLocks noChangeAspect="1"/>
+          </p:cNvPicPr>
+          <p:nvPr/>
+        </p:nvPicPr>
+        <p:blipFill>
+          <a:blip r:embed="rId4" cstate="print">
+            <a:extLst>
+              <a:ext uri="{28A0092B-C50C-407E-A947-70E740481C1C}">
+                <a14:useLocalDpi xmlns:a14="http://schemas.microsoft.com/office/drawing/2010/main" val="0"/>
+              </a:ext>
+            </a:extLst>
+          </a:blip>
+          <a:stretch>
+            <a:fillRect/>
+          </a:stretch>
+        </p:blipFill>
+        <p:spPr>
+          <a:xfrm>
+            <a:off x="429073" y="2555415"/>
+            <a:ext cx="11454468" cy="1066031"/>
+          </a:xfrm>
+          <a:prstGeom prst="rect">
+            <a:avLst/>
+          </a:prstGeom>
+        </p:spPr>
+      </p:pic>
+      <p:sp>
+        <p:nvSpPr>
+          <p:cNvPr id="12" name="矩形标注 11"/>
+          <p:cNvSpPr/>
+          <p:nvPr/>
+        </p:nvSpPr>
+        <p:spPr>
+          <a:xfrm>
+            <a:off x="5188597" y="1923752"/>
+            <a:ext cx="2509822" cy="534856"/>
+          </a:xfrm>
+          <a:prstGeom prst="wedgeRectCallout">
+            <a:avLst>
+              <a:gd name="adj1" fmla="val -76033"/>
+              <a:gd name="adj2" fmla="val 57951"/>
+            </a:avLst>
+          </a:prstGeom>
+          <a:solidFill>
+            <a:schemeClr val="tx1">
+              <a:lumMod val="85000"/>
+              <a:alpha val="50000"/>
+            </a:schemeClr>
+          </a:solidFill>
+          <a:ln>
+            <a:noFill/>
+          </a:ln>
+        </p:spPr>
+        <p:style>
+          <a:lnRef idx="0">
+            <a:scrgbClr r="0" g="0" b="0"/>
+          </a:lnRef>
+          <a:fillRef idx="0">
+            <a:scrgbClr r="0" g="0" b="0"/>
+          </a:fillRef>
+          <a:effectRef idx="0">
+            <a:scrgbClr r="0" g="0" b="0"/>
+          </a:effectRef>
+          <a:fontRef idx="minor">
+            <a:schemeClr val="lt1"/>
+          </a:fontRef>
+        </p:style>
+        <p:txBody>
+          <a:bodyPr rtlCol="0" anchor="ctr"/>
+          <a:lstStyle/>
+          <a:p>
+            <a:r>
+              <a:rPr lang="zh-CN" altLang="en-US" sz="1200" dirty="0" smtClean="0">
+                <a:solidFill>
+                  <a:schemeClr val="tx1"/>
+                </a:solidFill>
+                <a:latin typeface="微软雅黑" panose="020B0503020204020204" pitchFamily="34" charset="-122"/>
+                <a:ea typeface="微软雅黑" panose="020B0503020204020204" pitchFamily="34" charset="-122"/>
+              </a:rPr>
+              <a:t>把条件写在</a:t>
+            </a:r>
+            <a:r>
+              <a:rPr lang="en-US" altLang="zh-CN" sz="1200" dirty="0" smtClean="0">
+                <a:solidFill>
+                  <a:schemeClr val="tx1"/>
+                </a:solidFill>
+                <a:latin typeface="微软雅黑" panose="020B0503020204020204" pitchFamily="34" charset="-122"/>
+                <a:ea typeface="微软雅黑" panose="020B0503020204020204" pitchFamily="34" charset="-122"/>
+              </a:rPr>
+              <a:t>on</a:t>
+            </a:r>
+            <a:r>
+              <a:rPr lang="zh-CN" altLang="en-US" sz="1200" dirty="0" smtClean="0">
+                <a:solidFill>
+                  <a:schemeClr val="tx1"/>
+                </a:solidFill>
+                <a:latin typeface="微软雅黑" panose="020B0503020204020204" pitchFamily="34" charset="-122"/>
+                <a:ea typeface="微软雅黑" panose="020B0503020204020204" pitchFamily="34" charset="-122"/>
+              </a:rPr>
+              <a:t>中，驱动表是表</a:t>
+            </a:r>
+            <a:r>
+              <a:rPr lang="en-US" altLang="zh-CN" sz="1200" dirty="0" smtClean="0">
+                <a:solidFill>
+                  <a:schemeClr val="tx1"/>
+                </a:solidFill>
+                <a:latin typeface="微软雅黑" panose="020B0503020204020204" pitchFamily="34" charset="-122"/>
+                <a:ea typeface="微软雅黑" panose="020B0503020204020204" pitchFamily="34" charset="-122"/>
+              </a:rPr>
+              <a:t>a</a:t>
+            </a:r>
+            <a:r>
+              <a:rPr lang="zh-CN" altLang="en-US" sz="1200" dirty="0" smtClean="0">
+                <a:solidFill>
+                  <a:schemeClr val="tx1"/>
+                </a:solidFill>
+                <a:latin typeface="微软雅黑" panose="020B0503020204020204" pitchFamily="34" charset="-122"/>
+                <a:ea typeface="微软雅黑" panose="020B0503020204020204" pitchFamily="34" charset="-122"/>
+              </a:rPr>
+              <a:t>，被驱动表是</a:t>
+            </a:r>
+            <a:r>
+              <a:rPr lang="en-US" altLang="zh-CN" sz="1200" dirty="0" smtClean="0">
+                <a:solidFill>
+                  <a:schemeClr val="tx1"/>
+                </a:solidFill>
+                <a:latin typeface="微软雅黑" panose="020B0503020204020204" pitchFamily="34" charset="-122"/>
+                <a:ea typeface="微软雅黑" panose="020B0503020204020204" pitchFamily="34" charset="-122"/>
+              </a:rPr>
+              <a:t>b</a:t>
+            </a:r>
+            <a:r>
+              <a:rPr lang="zh-CN" altLang="en-US" sz="1200" dirty="0" smtClean="0">
+                <a:solidFill>
+                  <a:schemeClr val="tx1"/>
+                </a:solidFill>
+                <a:latin typeface="微软雅黑" panose="020B0503020204020204" pitchFamily="34" charset="-122"/>
+                <a:ea typeface="微软雅黑" panose="020B0503020204020204" pitchFamily="34" charset="-122"/>
+              </a:rPr>
+              <a:t>，表</a:t>
+            </a:r>
+            <a:r>
+              <a:rPr lang="en-US" altLang="zh-CN" sz="1200" dirty="0" smtClean="0">
+                <a:solidFill>
+                  <a:schemeClr val="tx1"/>
+                </a:solidFill>
+                <a:latin typeface="微软雅黑" panose="020B0503020204020204" pitchFamily="34" charset="-122"/>
+                <a:ea typeface="微软雅黑" panose="020B0503020204020204" pitchFamily="34" charset="-122"/>
+              </a:rPr>
+              <a:t>b</a:t>
+            </a:r>
+            <a:r>
+              <a:rPr lang="zh-CN" altLang="en-US" sz="1200" dirty="0" smtClean="0">
+                <a:solidFill>
+                  <a:schemeClr val="tx1"/>
+                </a:solidFill>
+                <a:latin typeface="微软雅黑" panose="020B0503020204020204" pitchFamily="34" charset="-122"/>
+                <a:ea typeface="微软雅黑" panose="020B0503020204020204" pitchFamily="34" charset="-122"/>
+              </a:rPr>
+              <a:t>的</a:t>
+            </a:r>
+            <a:r>
+              <a:rPr lang="en-US" altLang="zh-CN" sz="1200" dirty="0" smtClean="0">
+                <a:solidFill>
+                  <a:schemeClr val="tx1"/>
+                </a:solidFill>
+                <a:latin typeface="微软雅黑" panose="020B0503020204020204" pitchFamily="34" charset="-122"/>
+                <a:ea typeface="微软雅黑" panose="020B0503020204020204" pitchFamily="34" charset="-122"/>
+              </a:rPr>
+              <a:t>f1</a:t>
+            </a:r>
+            <a:r>
+              <a:rPr lang="zh-CN" altLang="en-US" sz="1200" dirty="0" smtClean="0">
+                <a:solidFill>
+                  <a:schemeClr val="tx1"/>
+                </a:solidFill>
+                <a:latin typeface="微软雅黑" panose="020B0503020204020204" pitchFamily="34" charset="-122"/>
+                <a:ea typeface="微软雅黑" panose="020B0503020204020204" pitchFamily="34" charset="-122"/>
+              </a:rPr>
+              <a:t>上没有索引，使用</a:t>
+            </a:r>
+            <a:r>
+              <a:rPr lang="en-US" altLang="zh-CN" sz="1200" dirty="0" smtClean="0">
+                <a:solidFill>
+                  <a:schemeClr val="tx1"/>
+                </a:solidFill>
+                <a:latin typeface="微软雅黑" panose="020B0503020204020204" pitchFamily="34" charset="-122"/>
+                <a:ea typeface="微软雅黑" panose="020B0503020204020204" pitchFamily="34" charset="-122"/>
+              </a:rPr>
+              <a:t>Block </a:t>
+            </a:r>
+            <a:r>
+              <a:rPr lang="en-US" altLang="zh-CN" sz="1200" dirty="0" err="1" smtClean="0">
+                <a:solidFill>
+                  <a:schemeClr val="tx1"/>
+                </a:solidFill>
+                <a:latin typeface="微软雅黑" panose="020B0503020204020204" pitchFamily="34" charset="-122"/>
+                <a:ea typeface="微软雅黑" panose="020B0503020204020204" pitchFamily="34" charset="-122"/>
+              </a:rPr>
+              <a:t>Nexted</a:t>
+            </a:r>
+            <a:r>
+              <a:rPr lang="en-US" altLang="zh-CN" sz="1200" dirty="0" smtClean="0">
+                <a:solidFill>
+                  <a:schemeClr val="tx1"/>
+                </a:solidFill>
+                <a:latin typeface="微软雅黑" panose="020B0503020204020204" pitchFamily="34" charset="-122"/>
+                <a:ea typeface="微软雅黑" panose="020B0503020204020204" pitchFamily="34" charset="-122"/>
+              </a:rPr>
+              <a:t> Loop</a:t>
+            </a:r>
+            <a:r>
+              <a:rPr lang="en-US" altLang="zh-CN" sz="1200" dirty="0">
+                <a:solidFill>
+                  <a:schemeClr val="tx1"/>
+                </a:solidFill>
+                <a:latin typeface="微软雅黑" panose="020B0503020204020204" pitchFamily="34" charset="-122"/>
+                <a:ea typeface="微软雅黑" panose="020B0503020204020204" pitchFamily="34" charset="-122"/>
+              </a:rPr>
+              <a:t> </a:t>
+            </a:r>
+            <a:r>
+              <a:rPr lang="en-US" altLang="zh-CN" sz="1200" dirty="0" smtClean="0">
+                <a:solidFill>
+                  <a:schemeClr val="tx1"/>
+                </a:solidFill>
+                <a:latin typeface="微软雅黑" panose="020B0503020204020204" pitchFamily="34" charset="-122"/>
+                <a:ea typeface="微软雅黑" panose="020B0503020204020204" pitchFamily="34" charset="-122"/>
+              </a:rPr>
+              <a:t>Join</a:t>
+            </a:r>
+            <a:r>
+              <a:rPr lang="zh-CN" altLang="en-US" sz="1200" dirty="0" smtClean="0">
+                <a:solidFill>
+                  <a:schemeClr val="tx1"/>
+                </a:solidFill>
+                <a:latin typeface="微软雅黑" panose="020B0503020204020204" pitchFamily="34" charset="-122"/>
+                <a:ea typeface="微软雅黑" panose="020B0503020204020204" pitchFamily="34" charset="-122"/>
+              </a:rPr>
+              <a:t>算法</a:t>
+            </a:r>
+            <a:endParaRPr lang="en-US" altLang="zh-CN" sz="1200" dirty="0" smtClean="0">
+              <a:solidFill>
+                <a:schemeClr val="tx1"/>
+              </a:solidFill>
+              <a:latin typeface="微软雅黑" panose="020B0503020204020204" pitchFamily="34" charset="-122"/>
+              <a:ea typeface="微软雅黑" panose="020B0503020204020204" pitchFamily="34" charset="-122"/>
+            </a:endParaRPr>
+          </a:p>
+        </p:txBody>
+      </p:sp>
+      <p:pic>
+        <p:nvPicPr>
+          <p:cNvPr id="5" name="图片 4"/>
+          <p:cNvPicPr>
+            <a:picLocks noChangeAspect="1"/>
+          </p:cNvPicPr>
+          <p:nvPr/>
+        </p:nvPicPr>
+        <p:blipFill>
+          <a:blip r:embed="rId5"/>
+          <a:stretch>
+            <a:fillRect/>
+          </a:stretch>
+        </p:blipFill>
+        <p:spPr>
+          <a:xfrm>
+            <a:off x="3914796" y="3605050"/>
+            <a:ext cx="3548063" cy="3252950"/>
+          </a:xfrm>
+          <a:prstGeom prst="rect">
+            <a:avLst/>
+          </a:prstGeom>
+        </p:spPr>
+      </p:pic>
+      <p:sp>
+        <p:nvSpPr>
+          <p:cNvPr id="14" name="矩形标注 13"/>
+          <p:cNvSpPr/>
+          <p:nvPr/>
+        </p:nvSpPr>
+        <p:spPr>
+          <a:xfrm>
+            <a:off x="764624" y="4181221"/>
+            <a:ext cx="2509822" cy="534856"/>
+          </a:xfrm>
+          <a:prstGeom prst="wedgeRectCallout">
+            <a:avLst>
+              <a:gd name="adj1" fmla="val 110055"/>
+              <a:gd name="adj2" fmla="val 5347"/>
+            </a:avLst>
+          </a:prstGeom>
+          <a:solidFill>
+            <a:schemeClr val="tx1">
+              <a:lumMod val="85000"/>
+              <a:alpha val="50000"/>
+            </a:schemeClr>
+          </a:solidFill>
+          <a:ln>
+            <a:solidFill>
+              <a:schemeClr val="accent1"/>
+            </a:solidFill>
+          </a:ln>
+        </p:spPr>
+        <p:style>
+          <a:lnRef idx="0">
+            <a:scrgbClr r="0" g="0" b="0"/>
+          </a:lnRef>
+          <a:fillRef idx="0">
+            <a:scrgbClr r="0" g="0" b="0"/>
+          </a:fillRef>
+          <a:effectRef idx="0">
+            <a:scrgbClr r="0" g="0" b="0"/>
+          </a:effectRef>
+          <a:fontRef idx="minor">
+            <a:schemeClr val="lt1"/>
+          </a:fontRef>
+        </p:style>
+        <p:txBody>
+          <a:bodyPr rtlCol="0" anchor="ctr"/>
+          <a:lstStyle/>
+          <a:p>
+            <a:r>
+              <a:rPr lang="zh-CN" altLang="en-US" sz="1200" dirty="0" smtClean="0">
+                <a:solidFill>
+                  <a:schemeClr val="tx1"/>
+                </a:solidFill>
+                <a:latin typeface="微软雅黑" panose="020B0503020204020204" pitchFamily="34" charset="-122"/>
+                <a:ea typeface="微软雅黑" panose="020B0503020204020204" pitchFamily="34" charset="-122"/>
+              </a:rPr>
+              <a:t>把表</a:t>
+            </a:r>
+            <a:r>
+              <a:rPr lang="en-US" altLang="zh-CN" sz="1200" dirty="0" smtClean="0">
+                <a:solidFill>
+                  <a:schemeClr val="tx1"/>
+                </a:solidFill>
+                <a:latin typeface="微软雅黑" panose="020B0503020204020204" pitchFamily="34" charset="-122"/>
+                <a:ea typeface="微软雅黑" panose="020B0503020204020204" pitchFamily="34" charset="-122"/>
+              </a:rPr>
+              <a:t>a</a:t>
+            </a:r>
+            <a:r>
+              <a:rPr lang="zh-CN" altLang="en-US" sz="1200" dirty="0" smtClean="0">
+                <a:solidFill>
+                  <a:schemeClr val="tx1"/>
+                </a:solidFill>
+                <a:latin typeface="微软雅黑" panose="020B0503020204020204" pitchFamily="34" charset="-122"/>
+                <a:ea typeface="微软雅黑" panose="020B0503020204020204" pitchFamily="34" charset="-122"/>
+              </a:rPr>
+              <a:t>的内容完全读入</a:t>
+            </a:r>
+            <a:r>
+              <a:rPr lang="en-US" altLang="zh-CN" sz="1200" dirty="0" err="1" smtClean="0">
+                <a:solidFill>
+                  <a:schemeClr val="tx1"/>
+                </a:solidFill>
+                <a:latin typeface="微软雅黑" panose="020B0503020204020204" pitchFamily="34" charset="-122"/>
+                <a:ea typeface="微软雅黑" panose="020B0503020204020204" pitchFamily="34" charset="-122"/>
+              </a:rPr>
+              <a:t>join_buffer</a:t>
+            </a:r>
+            <a:r>
+              <a:rPr lang="zh-CN" altLang="en-US" sz="1200" dirty="0" smtClean="0">
+                <a:solidFill>
+                  <a:schemeClr val="tx1"/>
+                </a:solidFill>
+                <a:latin typeface="微软雅黑" panose="020B0503020204020204" pitchFamily="34" charset="-122"/>
+                <a:ea typeface="微软雅黑" panose="020B0503020204020204" pitchFamily="34" charset="-122"/>
+              </a:rPr>
+              <a:t>，</a:t>
+            </a:r>
+            <a:endParaRPr lang="en-US" altLang="zh-CN" sz="1200" dirty="0" smtClean="0">
+              <a:solidFill>
+                <a:schemeClr val="tx1"/>
+              </a:solidFill>
+              <a:latin typeface="微软雅黑" panose="020B0503020204020204" pitchFamily="34" charset="-122"/>
+              <a:ea typeface="微软雅黑" panose="020B0503020204020204" pitchFamily="34" charset="-122"/>
+            </a:endParaRPr>
+          </a:p>
+        </p:txBody>
+      </p:sp>
+      <p:sp>
+        <p:nvSpPr>
+          <p:cNvPr id="15" name="矩形标注 14"/>
+          <p:cNvSpPr/>
+          <p:nvPr/>
+        </p:nvSpPr>
+        <p:spPr>
+          <a:xfrm>
+            <a:off x="555074" y="5609970"/>
+            <a:ext cx="2509822" cy="771779"/>
+          </a:xfrm>
+          <a:prstGeom prst="wedgeRectCallout">
+            <a:avLst>
+              <a:gd name="adj1" fmla="val 110055"/>
+              <a:gd name="adj2" fmla="val 5347"/>
+            </a:avLst>
+          </a:prstGeom>
+          <a:solidFill>
+            <a:schemeClr val="tx1">
+              <a:lumMod val="85000"/>
+              <a:alpha val="50000"/>
+            </a:schemeClr>
+          </a:solidFill>
+          <a:ln>
+            <a:solidFill>
+              <a:schemeClr val="accent1"/>
+            </a:solidFill>
+          </a:ln>
+        </p:spPr>
+        <p:style>
+          <a:lnRef idx="0">
+            <a:scrgbClr r="0" g="0" b="0"/>
+          </a:lnRef>
+          <a:fillRef idx="0">
+            <a:scrgbClr r="0" g="0" b="0"/>
+          </a:fillRef>
+          <a:effectRef idx="0">
+            <a:scrgbClr r="0" g="0" b="0"/>
+          </a:effectRef>
+          <a:fontRef idx="minor">
+            <a:schemeClr val="lt1"/>
+          </a:fontRef>
+        </p:style>
+        <p:txBody>
+          <a:bodyPr rtlCol="0" anchor="ctr"/>
+          <a:lstStyle/>
+          <a:p>
+            <a:r>
+              <a:rPr lang="zh-CN" altLang="en-US" sz="1200" dirty="0" smtClean="0">
+                <a:solidFill>
+                  <a:schemeClr val="tx1"/>
+                </a:solidFill>
+                <a:latin typeface="微软雅黑" panose="020B0503020204020204" pitchFamily="34" charset="-122"/>
+                <a:ea typeface="微软雅黑" panose="020B0503020204020204" pitchFamily="34" charset="-122"/>
+              </a:rPr>
+              <a:t>顺序扫描</a:t>
+            </a:r>
+            <a:r>
+              <a:rPr lang="en-US" altLang="zh-CN" sz="1200" dirty="0" smtClean="0">
+                <a:solidFill>
+                  <a:schemeClr val="tx1"/>
+                </a:solidFill>
+                <a:latin typeface="微软雅黑" panose="020B0503020204020204" pitchFamily="34" charset="-122"/>
+                <a:ea typeface="微软雅黑" panose="020B0503020204020204" pitchFamily="34" charset="-122"/>
+              </a:rPr>
+              <a:t>b</a:t>
+            </a:r>
+            <a:r>
+              <a:rPr lang="zh-CN" altLang="en-US" sz="1200" dirty="0" smtClean="0">
+                <a:solidFill>
+                  <a:schemeClr val="tx1"/>
+                </a:solidFill>
+                <a:latin typeface="微软雅黑" panose="020B0503020204020204" pitchFamily="34" charset="-122"/>
+                <a:ea typeface="微软雅黑" panose="020B0503020204020204" pitchFamily="34" charset="-122"/>
+              </a:rPr>
+              <a:t>，</a:t>
+            </a:r>
+            <a:r>
+              <a:rPr lang="zh-CN" altLang="en-US" sz="1200" dirty="0">
+                <a:solidFill>
+                  <a:schemeClr val="tx1"/>
+                </a:solidFill>
+                <a:latin typeface="微软雅黑" panose="020B0503020204020204" pitchFamily="34" charset="-122"/>
+                <a:ea typeface="微软雅黑" panose="020B0503020204020204" pitchFamily="34" charset="-122"/>
+              </a:rPr>
+              <a:t>如果有</a:t>
+            </a:r>
+            <a:r>
+              <a:rPr lang="en-US" altLang="zh-CN" sz="1200" dirty="0">
+                <a:solidFill>
+                  <a:schemeClr val="tx1"/>
+                </a:solidFill>
+                <a:latin typeface="微软雅黑" panose="020B0503020204020204" pitchFamily="34" charset="-122"/>
+                <a:ea typeface="微软雅黑" panose="020B0503020204020204" pitchFamily="34" charset="-122"/>
+              </a:rPr>
+              <a:t>where</a:t>
+            </a:r>
+            <a:r>
+              <a:rPr lang="zh-CN" altLang="en-US" sz="1200" dirty="0">
+                <a:solidFill>
+                  <a:schemeClr val="tx1"/>
+                </a:solidFill>
+                <a:latin typeface="微软雅黑" panose="020B0503020204020204" pitchFamily="34" charset="-122"/>
+                <a:ea typeface="微软雅黑" panose="020B0503020204020204" pitchFamily="34" charset="-122"/>
+              </a:rPr>
+              <a:t>，就过滤出满足条件</a:t>
+            </a:r>
+            <a:r>
+              <a:rPr lang="zh-CN" altLang="en-US" sz="1200" dirty="0" smtClean="0">
+                <a:solidFill>
+                  <a:schemeClr val="tx1"/>
+                </a:solidFill>
+                <a:latin typeface="微软雅黑" panose="020B0503020204020204" pitchFamily="34" charset="-122"/>
+                <a:ea typeface="微软雅黑" panose="020B0503020204020204" pitchFamily="34" charset="-122"/>
+              </a:rPr>
+              <a:t>的</a:t>
+            </a:r>
+            <a:r>
+              <a:rPr lang="zh-CN" altLang="en-US" sz="1200" dirty="0">
+                <a:solidFill>
+                  <a:schemeClr val="tx1"/>
+                </a:solidFill>
+                <a:latin typeface="微软雅黑" panose="020B0503020204020204" pitchFamily="34" charset="-122"/>
+                <a:ea typeface="微软雅黑" panose="020B0503020204020204" pitchFamily="34" charset="-122"/>
+              </a:rPr>
+              <a:t>数据</a:t>
+            </a:r>
+            <a:r>
+              <a:rPr lang="zh-CN" altLang="en-US" sz="1200" dirty="0" smtClean="0">
+                <a:solidFill>
+                  <a:schemeClr val="tx1"/>
+                </a:solidFill>
+                <a:latin typeface="微软雅黑" panose="020B0503020204020204" pitchFamily="34" charset="-122"/>
+                <a:ea typeface="微软雅黑" panose="020B0503020204020204" pitchFamily="34" charset="-122"/>
+              </a:rPr>
+              <a:t>；然后对于每一行数据，判断</a:t>
+            </a:r>
+            <a:r>
+              <a:rPr lang="en-US" altLang="zh-CN" sz="1200" dirty="0" smtClean="0">
+                <a:solidFill>
+                  <a:schemeClr val="tx1"/>
+                </a:solidFill>
+                <a:latin typeface="微软雅黑" panose="020B0503020204020204" pitchFamily="34" charset="-122"/>
+                <a:ea typeface="微软雅黑" panose="020B0503020204020204" pitchFamily="34" charset="-122"/>
+              </a:rPr>
+              <a:t>join</a:t>
+            </a:r>
+            <a:r>
+              <a:rPr lang="zh-CN" altLang="en-US" sz="1200" dirty="0" smtClean="0">
+                <a:solidFill>
+                  <a:schemeClr val="tx1"/>
+                </a:solidFill>
+                <a:latin typeface="微软雅黑" panose="020B0503020204020204" pitchFamily="34" charset="-122"/>
+                <a:ea typeface="微软雅黑" panose="020B0503020204020204" pitchFamily="34" charset="-122"/>
+              </a:rPr>
+              <a:t>条件，满足的就返回。</a:t>
+            </a:r>
+            <a:endParaRPr lang="en-US" altLang="zh-CN" sz="1200" dirty="0" smtClean="0">
+              <a:solidFill>
+                <a:schemeClr val="tx1"/>
+              </a:solidFill>
+              <a:latin typeface="微软雅黑" panose="020B0503020204020204" pitchFamily="34" charset="-122"/>
+              <a:ea typeface="微软雅黑" panose="020B0503020204020204" pitchFamily="34" charset="-122"/>
+            </a:endParaRPr>
+          </a:p>
+        </p:txBody>
+      </p:sp>
+      <p:sp>
+        <p:nvSpPr>
+          <p:cNvPr id="16" name="矩形标注 15"/>
+          <p:cNvSpPr/>
+          <p:nvPr/>
+        </p:nvSpPr>
+        <p:spPr>
+          <a:xfrm>
+            <a:off x="8103209" y="4853833"/>
+            <a:ext cx="2509822" cy="771779"/>
+          </a:xfrm>
+          <a:prstGeom prst="wedgeRectCallout">
+            <a:avLst>
+              <a:gd name="adj1" fmla="val -80838"/>
+              <a:gd name="adj2" fmla="val 38669"/>
+            </a:avLst>
+          </a:prstGeom>
+          <a:solidFill>
+            <a:schemeClr val="tx1">
+              <a:lumMod val="85000"/>
+              <a:alpha val="50000"/>
+            </a:schemeClr>
+          </a:solidFill>
+          <a:ln>
+            <a:solidFill>
+              <a:schemeClr val="accent1"/>
+            </a:solidFill>
+          </a:ln>
+        </p:spPr>
+        <p:style>
+          <a:lnRef idx="0">
+            <a:scrgbClr r="0" g="0" b="0"/>
+          </a:lnRef>
+          <a:fillRef idx="0">
+            <a:scrgbClr r="0" g="0" b="0"/>
+          </a:fillRef>
+          <a:effectRef idx="0">
+            <a:scrgbClr r="0" g="0" b="0"/>
+          </a:effectRef>
+          <a:fontRef idx="minor">
+            <a:schemeClr val="lt1"/>
+          </a:fontRef>
+        </p:style>
+        <p:txBody>
+          <a:bodyPr rtlCol="0" anchor="ctr"/>
+          <a:lstStyle/>
+          <a:p>
+            <a:r>
+              <a:rPr lang="zh-CN" altLang="en-US" sz="1200" dirty="0" smtClean="0">
+                <a:solidFill>
+                  <a:schemeClr val="tx1"/>
+                </a:solidFill>
+                <a:latin typeface="微软雅黑" panose="020B0503020204020204" pitchFamily="34" charset="-122"/>
+                <a:ea typeface="微软雅黑" panose="020B0503020204020204" pitchFamily="34" charset="-122"/>
+              </a:rPr>
+              <a:t>表</a:t>
+            </a:r>
+            <a:r>
+              <a:rPr lang="en-US" altLang="zh-CN" sz="1200" dirty="0" smtClean="0">
+                <a:solidFill>
+                  <a:schemeClr val="tx1"/>
+                </a:solidFill>
+                <a:latin typeface="微软雅黑" panose="020B0503020204020204" pitchFamily="34" charset="-122"/>
+                <a:ea typeface="微软雅黑" panose="020B0503020204020204" pitchFamily="34" charset="-122"/>
+              </a:rPr>
+              <a:t>b</a:t>
+            </a:r>
+            <a:r>
+              <a:rPr lang="zh-CN" altLang="en-US" sz="1200" dirty="0" smtClean="0">
+                <a:solidFill>
+                  <a:schemeClr val="tx1"/>
+                </a:solidFill>
+                <a:latin typeface="微软雅黑" panose="020B0503020204020204" pitchFamily="34" charset="-122"/>
+                <a:ea typeface="微软雅黑" panose="020B0503020204020204" pitchFamily="34" charset="-122"/>
+              </a:rPr>
+              <a:t>扫描完成后，对于没有被匹配的表</a:t>
+            </a:r>
+            <a:r>
+              <a:rPr lang="en-US" altLang="zh-CN" sz="1200" dirty="0" smtClean="0">
+                <a:solidFill>
+                  <a:schemeClr val="tx1"/>
+                </a:solidFill>
+                <a:latin typeface="微软雅黑" panose="020B0503020204020204" pitchFamily="34" charset="-122"/>
+                <a:ea typeface="微软雅黑" panose="020B0503020204020204" pitchFamily="34" charset="-122"/>
+              </a:rPr>
+              <a:t>a</a:t>
+            </a:r>
+            <a:r>
+              <a:rPr lang="zh-CN" altLang="en-US" sz="1200" dirty="0" smtClean="0">
+                <a:solidFill>
+                  <a:schemeClr val="tx1"/>
+                </a:solidFill>
+                <a:latin typeface="微软雅黑" panose="020B0503020204020204" pitchFamily="34" charset="-122"/>
+                <a:ea typeface="微软雅黑" panose="020B0503020204020204" pitchFamily="34" charset="-122"/>
+              </a:rPr>
+              <a:t>的行，填上</a:t>
+            </a:r>
+            <a:r>
+              <a:rPr lang="en-US" altLang="zh-CN" sz="1200" dirty="0" smtClean="0">
+                <a:solidFill>
+                  <a:schemeClr val="tx1"/>
+                </a:solidFill>
+                <a:latin typeface="微软雅黑" panose="020B0503020204020204" pitchFamily="34" charset="-122"/>
+                <a:ea typeface="微软雅黑" panose="020B0503020204020204" pitchFamily="34" charset="-122"/>
+              </a:rPr>
+              <a:t>NULL</a:t>
+            </a:r>
+            <a:r>
+              <a:rPr lang="zh-CN" altLang="en-US" sz="1200" dirty="0" smtClean="0">
+                <a:solidFill>
+                  <a:schemeClr val="tx1"/>
+                </a:solidFill>
+                <a:latin typeface="微软雅黑" panose="020B0503020204020204" pitchFamily="34" charset="-122"/>
+                <a:ea typeface="微软雅黑" panose="020B0503020204020204" pitchFamily="34" charset="-122"/>
+              </a:rPr>
+              <a:t>，成为结果集。</a:t>
+            </a:r>
+            <a:endParaRPr lang="en-US" altLang="zh-CN" sz="1200" dirty="0" smtClean="0">
+              <a:solidFill>
+                <a:schemeClr val="tx1"/>
+              </a:solidFill>
+              <a:latin typeface="微软雅黑" panose="020B0503020204020204" pitchFamily="34" charset="-122"/>
+              <a:ea typeface="微软雅黑" panose="020B0503020204020204" pitchFamily="34" charset="-122"/>
+            </a:endParaRPr>
+          </a:p>
+        </p:txBody>
+      </p:sp>
+    </p:spTree>
+    <p:extLst>
+      <p:ext uri="{BB962C8B-B14F-4D97-AF65-F5344CB8AC3E}">
+        <p14:creationId xmlns:p14="http://schemas.microsoft.com/office/powerpoint/2010/main" val="995531173"/>
+      </p:ext>
+    </p:extLst>
+  </p:cSld>
+  <p:clrMapOvr>
+    <a:masterClrMapping/>
+  </p:clrMapOvr>
+  <p:timing>
+    <p:tnLst>
+      <p:par>
+        <p:cTn id="1" dur="indefinite" restart="never" nodeType="tmRoot"/>
+      </p:par>
+    </p:tnLst>
+  </p:timing>
+</p:sld>
+</file>
+
+<file path=ppt/slides/slide8.xml><?xml version="1.0" encoding="utf-8"?>
+<p:sld xmlns:a="http://schemas.openxmlformats.org/drawingml/2006/main" xmlns:r="http://schemas.openxmlformats.org/officeDocument/2006/relationships" xmlns:p="http://schemas.openxmlformats.org/presentationml/2006/main">
+  <p:cSld>
+    <p:spTree>
+      <p:nvGrpSpPr>
+        <p:cNvPr id="1" name=""/>
+        <p:cNvGrpSpPr/>
+        <p:nvPr/>
+      </p:nvGrpSpPr>
+      <p:grpSpPr>
+        <a:xfrm>
+          <a:off x="0" y="0"/>
+          <a:ext cx="0" cy="0"/>
+          <a:chOff x="0" y="0"/>
+          <a:chExt cx="0" cy="0"/>
+        </a:xfrm>
+      </p:grpSpPr>
+      <p:sp>
+        <p:nvSpPr>
+          <p:cNvPr id="2" name="标题 1"/>
+          <p:cNvSpPr>
+            <a:spLocks noGrp="1"/>
+          </p:cNvSpPr>
+          <p:nvPr>
+            <p:ph type="title"/>
+          </p:nvPr>
+        </p:nvSpPr>
+        <p:spPr>
+          <a:xfrm>
+            <a:off x="114300" y="152400"/>
+            <a:ext cx="11149057" cy="602359"/>
+          </a:xfrm>
+        </p:spPr>
+        <p:txBody>
+          <a:bodyPr/>
+          <a:lstStyle/>
+          <a:p>
+            <a:r>
+              <a:rPr lang="en-US" altLang="zh-CN" sz="3200" b="1" dirty="0">
+                <a:latin typeface="微软雅黑" panose="020B0503020204020204" pitchFamily="34" charset="-122"/>
+                <a:ea typeface="微软雅黑" panose="020B0503020204020204" pitchFamily="34" charset="-122"/>
+              </a:rPr>
+              <a:t>34 | </a:t>
+            </a:r>
+            <a:r>
+              <a:rPr lang="zh-CN" altLang="en-US" sz="3200" b="1" dirty="0">
+                <a:latin typeface="微软雅黑" panose="020B0503020204020204" pitchFamily="34" charset="-122"/>
+                <a:ea typeface="微软雅黑" panose="020B0503020204020204" pitchFamily="34" charset="-122"/>
+              </a:rPr>
+              <a:t>到底可不可以使用</a:t>
+            </a:r>
+            <a:r>
+              <a:rPr lang="en-US" altLang="zh-CN" sz="3200" b="1" dirty="0">
+                <a:latin typeface="微软雅黑" panose="020B0503020204020204" pitchFamily="34" charset="-122"/>
+                <a:ea typeface="微软雅黑" panose="020B0503020204020204" pitchFamily="34" charset="-122"/>
+              </a:rPr>
+              <a:t>join</a:t>
+            </a:r>
+            <a:r>
+              <a:rPr lang="zh-CN" altLang="en-US" sz="3200" b="1" dirty="0">
+                <a:latin typeface="微软雅黑" panose="020B0503020204020204" pitchFamily="34" charset="-122"/>
+                <a:ea typeface="微软雅黑" panose="020B0503020204020204" pitchFamily="34" charset="-122"/>
+              </a:rPr>
+              <a:t>？</a:t>
+            </a:r>
+          </a:p>
+        </p:txBody>
+      </p:sp>
+      <p:sp>
+        <p:nvSpPr>
+          <p:cNvPr id="31" name="文本框 30"/>
+          <p:cNvSpPr txBox="1"/>
+          <p:nvPr/>
+        </p:nvSpPr>
+        <p:spPr>
+          <a:xfrm>
+            <a:off x="117196" y="754759"/>
+            <a:ext cx="8314007" cy="369332"/>
+          </a:xfrm>
+          <a:prstGeom prst="rect">
+            <a:avLst/>
+          </a:prstGeom>
+          <a:noFill/>
+        </p:spPr>
+        <p:txBody>
+          <a:bodyPr wrap="none">
+            <a:spAutoFit/>
+            <a:scene3d>
+              <a:camera prst="orthographicFront"/>
+              <a:lightRig rig="harsh" dir="t"/>
+            </a:scene3d>
+            <a:sp3d extrusionH="57150" prstMaterial="matte">
+              <a:bevelT w="63500" h="12700" prst="angle"/>
+              <a:contourClr>
+                <a:schemeClr val="bg1">
+                  <a:lumMod val="65000"/>
+                </a:schemeClr>
+              </a:contourClr>
+            </a:sp3d>
+          </a:bodyPr>
+          <a:lstStyle/>
+          <a:p>
+            <a:pPr>
+              <a:defRPr/>
+            </a:pPr>
+            <a:r>
+              <a:rPr lang="zh-CN" altLang="en-US" b="1" dirty="0" smtClean="0">
+                <a:ln/>
+                <a:solidFill>
+                  <a:srgbClr val="4FD1FF"/>
+                </a:solidFill>
+                <a:latin typeface="微软雅黑" panose="020B0503020204020204" pitchFamily="34" charset="-122"/>
+                <a:ea typeface="微软雅黑" panose="020B0503020204020204" pitchFamily="34" charset="-122"/>
+              </a:rPr>
+              <a:t>问题：</a:t>
+            </a:r>
+            <a:r>
+              <a:rPr lang="en-US" altLang="zh-CN" b="1" dirty="0" smtClean="0">
+                <a:ln/>
+                <a:solidFill>
+                  <a:srgbClr val="4FD1FF"/>
+                </a:solidFill>
+                <a:latin typeface="微软雅黑" panose="020B0503020204020204" pitchFamily="34" charset="-122"/>
+                <a:ea typeface="微软雅黑" panose="020B0503020204020204" pitchFamily="34" charset="-122"/>
+              </a:rPr>
+              <a:t>left join</a:t>
+            </a:r>
+            <a:r>
+              <a:rPr lang="zh-CN" altLang="en-US" b="1" dirty="0" smtClean="0">
+                <a:ln/>
+                <a:solidFill>
+                  <a:srgbClr val="4FD1FF"/>
+                </a:solidFill>
+                <a:latin typeface="微软雅黑" panose="020B0503020204020204" pitchFamily="34" charset="-122"/>
+                <a:ea typeface="微软雅黑" panose="020B0503020204020204" pitchFamily="34" charset="-122"/>
+              </a:rPr>
+              <a:t>的左边的表一定是驱动表吗？</a:t>
+            </a:r>
+            <a:r>
+              <a:rPr lang="en-US" altLang="zh-CN" b="1" dirty="0" smtClean="0">
+                <a:ln/>
+                <a:solidFill>
+                  <a:srgbClr val="4FD1FF"/>
+                </a:solidFill>
+                <a:latin typeface="微软雅黑" panose="020B0503020204020204" pitchFamily="34" charset="-122"/>
+                <a:ea typeface="微软雅黑" panose="020B0503020204020204" pitchFamily="34" charset="-122"/>
+              </a:rPr>
+              <a:t>join</a:t>
+            </a:r>
+            <a:r>
+              <a:rPr lang="zh-CN" altLang="en-US" b="1" dirty="0" smtClean="0">
+                <a:ln/>
+                <a:solidFill>
+                  <a:srgbClr val="4FD1FF"/>
+                </a:solidFill>
+                <a:latin typeface="微软雅黑" panose="020B0503020204020204" pitchFamily="34" charset="-122"/>
+                <a:ea typeface="微软雅黑" panose="020B0503020204020204" pitchFamily="34" charset="-122"/>
+              </a:rPr>
+              <a:t>的时候</a:t>
+            </a:r>
+            <a:r>
+              <a:rPr lang="en-US" altLang="zh-CN" b="1" dirty="0" smtClean="0">
+                <a:ln/>
+                <a:solidFill>
+                  <a:srgbClr val="4FD1FF"/>
+                </a:solidFill>
+                <a:latin typeface="微软雅黑" panose="020B0503020204020204" pitchFamily="34" charset="-122"/>
+                <a:ea typeface="微软雅黑" panose="020B0503020204020204" pitchFamily="34" charset="-122"/>
+              </a:rPr>
+              <a:t>on</a:t>
+            </a:r>
+            <a:r>
+              <a:rPr lang="zh-CN" altLang="en-US" b="1" dirty="0" smtClean="0">
+                <a:ln/>
+                <a:solidFill>
+                  <a:srgbClr val="4FD1FF"/>
+                </a:solidFill>
+                <a:latin typeface="微软雅黑" panose="020B0503020204020204" pitchFamily="34" charset="-122"/>
+                <a:ea typeface="微软雅黑" panose="020B0503020204020204" pitchFamily="34" charset="-122"/>
+              </a:rPr>
+              <a:t>和</a:t>
+            </a:r>
+            <a:r>
+              <a:rPr lang="en-US" altLang="zh-CN" b="1" dirty="0" smtClean="0">
+                <a:ln/>
+                <a:solidFill>
+                  <a:srgbClr val="4FD1FF"/>
+                </a:solidFill>
+                <a:latin typeface="微软雅黑" panose="020B0503020204020204" pitchFamily="34" charset="-122"/>
+                <a:ea typeface="微软雅黑" panose="020B0503020204020204" pitchFamily="34" charset="-122"/>
+              </a:rPr>
+              <a:t>where</a:t>
+            </a:r>
+            <a:r>
+              <a:rPr lang="zh-CN" altLang="en-US" b="1" dirty="0" smtClean="0">
+                <a:ln/>
+                <a:solidFill>
+                  <a:srgbClr val="4FD1FF"/>
+                </a:solidFill>
+                <a:latin typeface="微软雅黑" panose="020B0503020204020204" pitchFamily="34" charset="-122"/>
+                <a:ea typeface="微软雅黑" panose="020B0503020204020204" pitchFamily="34" charset="-122"/>
+              </a:rPr>
+              <a:t>应该怎么用</a:t>
+            </a:r>
+            <a:endParaRPr lang="en-US" altLang="zh-CN" b="1" dirty="0" smtClean="0">
+              <a:ln/>
+              <a:solidFill>
+                <a:srgbClr val="4FD1FF"/>
+              </a:solidFill>
+              <a:latin typeface="微软雅黑" panose="020B0503020204020204" pitchFamily="34" charset="-122"/>
+              <a:ea typeface="微软雅黑" panose="020B0503020204020204" pitchFamily="34" charset="-122"/>
+            </a:endParaRPr>
+          </a:p>
+        </p:txBody>
+      </p:sp>
+      <p:sp>
+        <p:nvSpPr>
+          <p:cNvPr id="75" name="矩形 74"/>
+          <p:cNvSpPr/>
+          <p:nvPr/>
+        </p:nvSpPr>
+        <p:spPr>
+          <a:xfrm>
+            <a:off x="114300" y="1258176"/>
+            <a:ext cx="11856027" cy="954107"/>
+          </a:xfrm>
+          <a:prstGeom prst="rect">
+            <a:avLst/>
+          </a:prstGeom>
+        </p:spPr>
+        <p:txBody>
+          <a:bodyPr wrap="square">
+            <a:spAutoFit/>
+          </a:bodyPr>
+          <a:lstStyle/>
+          <a:p>
+            <a:r>
+              <a:rPr lang="en-US" altLang="zh-CN" sz="1400" dirty="0">
+                <a:solidFill>
+                  <a:srgbClr val="92D050"/>
+                </a:solidFill>
+                <a:latin typeface="微软雅黑" panose="020B0503020204020204" pitchFamily="34" charset="-122"/>
+                <a:ea typeface="微软雅黑" panose="020B0503020204020204" pitchFamily="34" charset="-122"/>
+              </a:rPr>
+              <a:t>create table a(f1 </a:t>
+            </a:r>
+            <a:r>
+              <a:rPr lang="en-US" altLang="zh-CN" sz="1400" dirty="0" err="1">
+                <a:solidFill>
+                  <a:srgbClr val="92D050"/>
+                </a:solidFill>
+                <a:latin typeface="微软雅黑" panose="020B0503020204020204" pitchFamily="34" charset="-122"/>
+                <a:ea typeface="微软雅黑" panose="020B0503020204020204" pitchFamily="34" charset="-122"/>
+              </a:rPr>
+              <a:t>int</a:t>
+            </a:r>
+            <a:r>
+              <a:rPr lang="en-US" altLang="zh-CN" sz="1400" dirty="0">
+                <a:solidFill>
+                  <a:srgbClr val="92D050"/>
+                </a:solidFill>
+                <a:latin typeface="微软雅黑" panose="020B0503020204020204" pitchFamily="34" charset="-122"/>
+                <a:ea typeface="微软雅黑" panose="020B0503020204020204" pitchFamily="34" charset="-122"/>
+              </a:rPr>
+              <a:t>, f2 </a:t>
+            </a:r>
+            <a:r>
+              <a:rPr lang="en-US" altLang="zh-CN" sz="1400" dirty="0" err="1">
+                <a:solidFill>
+                  <a:srgbClr val="92D050"/>
+                </a:solidFill>
+                <a:latin typeface="微软雅黑" panose="020B0503020204020204" pitchFamily="34" charset="-122"/>
+                <a:ea typeface="微软雅黑" panose="020B0503020204020204" pitchFamily="34" charset="-122"/>
+              </a:rPr>
+              <a:t>int</a:t>
+            </a:r>
+            <a:r>
+              <a:rPr lang="en-US" altLang="zh-CN" sz="1400" dirty="0">
+                <a:solidFill>
+                  <a:srgbClr val="92D050"/>
+                </a:solidFill>
+                <a:latin typeface="微软雅黑" panose="020B0503020204020204" pitchFamily="34" charset="-122"/>
+                <a:ea typeface="微软雅黑" panose="020B0503020204020204" pitchFamily="34" charset="-122"/>
+              </a:rPr>
+              <a:t>, index(f1))engine=</a:t>
+            </a:r>
+            <a:r>
+              <a:rPr lang="en-US" altLang="zh-CN" sz="1400" dirty="0" err="1">
+                <a:solidFill>
+                  <a:srgbClr val="92D050"/>
+                </a:solidFill>
+                <a:latin typeface="微软雅黑" panose="020B0503020204020204" pitchFamily="34" charset="-122"/>
+                <a:ea typeface="微软雅黑" panose="020B0503020204020204" pitchFamily="34" charset="-122"/>
+              </a:rPr>
+              <a:t>innodb</a:t>
+            </a:r>
+            <a:r>
+              <a:rPr lang="en-US" altLang="zh-CN" sz="1400" dirty="0">
+                <a:solidFill>
+                  <a:srgbClr val="92D050"/>
+                </a:solidFill>
+                <a:latin typeface="微软雅黑" panose="020B0503020204020204" pitchFamily="34" charset="-122"/>
+                <a:ea typeface="微软雅黑" panose="020B0503020204020204" pitchFamily="34" charset="-122"/>
+              </a:rPr>
+              <a:t>;</a:t>
+            </a:r>
+          </a:p>
+          <a:p>
+            <a:r>
+              <a:rPr lang="en-US" altLang="zh-CN" sz="1400" dirty="0">
+                <a:solidFill>
+                  <a:srgbClr val="92D050"/>
+                </a:solidFill>
+                <a:latin typeface="微软雅黑" panose="020B0503020204020204" pitchFamily="34" charset="-122"/>
+                <a:ea typeface="微软雅黑" panose="020B0503020204020204" pitchFamily="34" charset="-122"/>
+              </a:rPr>
+              <a:t>create table b(f1 </a:t>
+            </a:r>
+            <a:r>
+              <a:rPr lang="en-US" altLang="zh-CN" sz="1400" dirty="0" err="1">
+                <a:solidFill>
+                  <a:srgbClr val="92D050"/>
+                </a:solidFill>
+                <a:latin typeface="微软雅黑" panose="020B0503020204020204" pitchFamily="34" charset="-122"/>
+                <a:ea typeface="微软雅黑" panose="020B0503020204020204" pitchFamily="34" charset="-122"/>
+              </a:rPr>
+              <a:t>int</a:t>
+            </a:r>
+            <a:r>
+              <a:rPr lang="en-US" altLang="zh-CN" sz="1400" dirty="0">
+                <a:solidFill>
+                  <a:srgbClr val="92D050"/>
+                </a:solidFill>
+                <a:latin typeface="微软雅黑" panose="020B0503020204020204" pitchFamily="34" charset="-122"/>
+                <a:ea typeface="微软雅黑" panose="020B0503020204020204" pitchFamily="34" charset="-122"/>
+              </a:rPr>
+              <a:t>, f2 </a:t>
+            </a:r>
+            <a:r>
+              <a:rPr lang="en-US" altLang="zh-CN" sz="1400" dirty="0" err="1">
+                <a:solidFill>
+                  <a:srgbClr val="92D050"/>
+                </a:solidFill>
+                <a:latin typeface="微软雅黑" panose="020B0503020204020204" pitchFamily="34" charset="-122"/>
+                <a:ea typeface="微软雅黑" panose="020B0503020204020204" pitchFamily="34" charset="-122"/>
+              </a:rPr>
+              <a:t>int</a:t>
+            </a:r>
+            <a:r>
+              <a:rPr lang="en-US" altLang="zh-CN" sz="1400" dirty="0">
+                <a:solidFill>
+                  <a:srgbClr val="92D050"/>
+                </a:solidFill>
+                <a:latin typeface="微软雅黑" panose="020B0503020204020204" pitchFamily="34" charset="-122"/>
+                <a:ea typeface="微软雅黑" panose="020B0503020204020204" pitchFamily="34" charset="-122"/>
+              </a:rPr>
+              <a:t>)engine=</a:t>
+            </a:r>
+            <a:r>
+              <a:rPr lang="en-US" altLang="zh-CN" sz="1400" dirty="0" err="1">
+                <a:solidFill>
+                  <a:srgbClr val="92D050"/>
+                </a:solidFill>
+                <a:latin typeface="微软雅黑" panose="020B0503020204020204" pitchFamily="34" charset="-122"/>
+                <a:ea typeface="微软雅黑" panose="020B0503020204020204" pitchFamily="34" charset="-122"/>
+              </a:rPr>
+              <a:t>innodb</a:t>
+            </a:r>
+            <a:r>
+              <a:rPr lang="en-US" altLang="zh-CN" sz="1400" dirty="0">
+                <a:solidFill>
+                  <a:srgbClr val="92D050"/>
+                </a:solidFill>
+                <a:latin typeface="微软雅黑" panose="020B0503020204020204" pitchFamily="34" charset="-122"/>
+                <a:ea typeface="微软雅黑" panose="020B0503020204020204" pitchFamily="34" charset="-122"/>
+              </a:rPr>
+              <a:t>;</a:t>
+            </a:r>
+          </a:p>
+          <a:p>
+            <a:r>
+              <a:rPr lang="en-US" altLang="zh-CN" sz="1400" dirty="0">
+                <a:solidFill>
+                  <a:srgbClr val="92D050"/>
+                </a:solidFill>
+                <a:latin typeface="微软雅黑" panose="020B0503020204020204" pitchFamily="34" charset="-122"/>
+                <a:ea typeface="微软雅黑" panose="020B0503020204020204" pitchFamily="34" charset="-122"/>
+              </a:rPr>
+              <a:t>insert into a values(1,1),(2,2),(3,3),(4,4),(5,5),(6,6);</a:t>
+            </a:r>
+          </a:p>
+          <a:p>
+            <a:r>
+              <a:rPr lang="en-US" altLang="zh-CN" sz="1400" dirty="0">
+                <a:solidFill>
+                  <a:srgbClr val="92D050"/>
+                </a:solidFill>
+                <a:latin typeface="微软雅黑" panose="020B0503020204020204" pitchFamily="34" charset="-122"/>
+                <a:ea typeface="微软雅黑" panose="020B0503020204020204" pitchFamily="34" charset="-122"/>
+              </a:rPr>
+              <a:t>insert into b values(3,3),(4,4),(5,5),(6,6),(7,7),(8,8);</a:t>
+            </a:r>
+          </a:p>
+        </p:txBody>
+      </p:sp>
+      <p:pic>
+        <p:nvPicPr>
+          <p:cNvPr id="3" name="图片 2"/>
+          <p:cNvPicPr>
+            <a:picLocks noChangeAspect="1"/>
+          </p:cNvPicPr>
+          <p:nvPr/>
+        </p:nvPicPr>
+        <p:blipFill>
+          <a:blip r:embed="rId3" cstate="print">
+            <a:extLst>
+              <a:ext uri="{28A0092B-C50C-407E-A947-70E740481C1C}">
+                <a14:useLocalDpi xmlns:a14="http://schemas.microsoft.com/office/drawing/2010/main" val="0"/>
+              </a:ext>
+            </a:extLst>
+          </a:blip>
+          <a:stretch>
+            <a:fillRect/>
+          </a:stretch>
+        </p:blipFill>
+        <p:spPr>
+          <a:xfrm>
+            <a:off x="7920092" y="127677"/>
+            <a:ext cx="3524172" cy="2348012"/>
+          </a:xfrm>
+          <a:prstGeom prst="rect">
+            <a:avLst/>
+          </a:prstGeom>
+        </p:spPr>
+      </p:pic>
+      <p:sp>
+        <p:nvSpPr>
+          <p:cNvPr id="9" name="矩形标注 8"/>
+          <p:cNvSpPr/>
+          <p:nvPr/>
+        </p:nvSpPr>
+        <p:spPr>
+          <a:xfrm>
+            <a:off x="9682178" y="416373"/>
+            <a:ext cx="2509822" cy="534856"/>
+          </a:xfrm>
+          <a:prstGeom prst="wedgeRectCallout">
+            <a:avLst>
+              <a:gd name="adj1" fmla="val -63141"/>
+              <a:gd name="adj2" fmla="val -15694"/>
+            </a:avLst>
+          </a:prstGeom>
+          <a:solidFill>
+            <a:schemeClr val="tx1">
+              <a:lumMod val="85000"/>
+              <a:alpha val="50000"/>
+            </a:schemeClr>
+          </a:solidFill>
+          <a:ln>
+            <a:noFill/>
+          </a:ln>
+        </p:spPr>
+        <p:style>
+          <a:lnRef idx="0">
+            <a:scrgbClr r="0" g="0" b="0"/>
+          </a:lnRef>
+          <a:fillRef idx="0">
+            <a:scrgbClr r="0" g="0" b="0"/>
+          </a:fillRef>
+          <a:effectRef idx="0">
+            <a:scrgbClr r="0" g="0" b="0"/>
+          </a:effectRef>
+          <a:fontRef idx="minor">
+            <a:schemeClr val="lt1"/>
+          </a:fontRef>
+        </p:style>
+        <p:txBody>
+          <a:bodyPr rtlCol="0" anchor="ctr"/>
+          <a:lstStyle/>
+          <a:p>
+            <a:r>
+              <a:rPr lang="zh-CN" altLang="en-US" sz="1200" dirty="0">
+                <a:latin typeface="微软雅黑" panose="020B0503020204020204" pitchFamily="34" charset="-122"/>
+                <a:ea typeface="微软雅黑" panose="020B0503020204020204" pitchFamily="34" charset="-122"/>
+              </a:rPr>
+              <a:t>把</a:t>
+            </a:r>
+            <a:r>
+              <a:rPr lang="zh-CN" altLang="en-US" sz="1200" dirty="0" smtClean="0">
+                <a:latin typeface="微软雅黑" panose="020B0503020204020204" pitchFamily="34" charset="-122"/>
+                <a:ea typeface="微软雅黑" panose="020B0503020204020204" pitchFamily="34" charset="-122"/>
+              </a:rPr>
+              <a:t>条件写在</a:t>
+            </a:r>
+            <a:r>
+              <a:rPr lang="en-US" altLang="zh-CN" sz="1200" dirty="0" smtClean="0">
+                <a:latin typeface="微软雅黑" panose="020B0503020204020204" pitchFamily="34" charset="-122"/>
+                <a:ea typeface="微软雅黑" panose="020B0503020204020204" pitchFamily="34" charset="-122"/>
+              </a:rPr>
+              <a:t>on</a:t>
+            </a:r>
+            <a:r>
+              <a:rPr lang="zh-CN" altLang="en-US" sz="1200" dirty="0" smtClean="0">
+                <a:latin typeface="微软雅黑" panose="020B0503020204020204" pitchFamily="34" charset="-122"/>
+                <a:ea typeface="微软雅黑" panose="020B0503020204020204" pitchFamily="34" charset="-122"/>
+              </a:rPr>
+              <a:t>中，</a:t>
+            </a:r>
+            <a:r>
+              <a:rPr lang="en-US" altLang="zh-CN" sz="1200" dirty="0" smtClean="0">
+                <a:latin typeface="微软雅黑" panose="020B0503020204020204" pitchFamily="34" charset="-122"/>
+                <a:ea typeface="微软雅黑" panose="020B0503020204020204" pitchFamily="34" charset="-122"/>
+              </a:rPr>
+              <a:t>a</a:t>
+            </a:r>
+            <a:r>
+              <a:rPr lang="zh-CN" altLang="en-US" sz="1200" dirty="0" smtClean="0">
+                <a:latin typeface="微软雅黑" panose="020B0503020204020204" pitchFamily="34" charset="-122"/>
+                <a:ea typeface="微软雅黑" panose="020B0503020204020204" pitchFamily="34" charset="-122"/>
+              </a:rPr>
+              <a:t>做全表扫描，</a:t>
+            </a:r>
+            <a:r>
+              <a:rPr lang="en-US" altLang="zh-CN" sz="1200" dirty="0" smtClean="0">
+                <a:latin typeface="微软雅黑" panose="020B0503020204020204" pitchFamily="34" charset="-122"/>
+                <a:ea typeface="微软雅黑" panose="020B0503020204020204" pitchFamily="34" charset="-122"/>
+              </a:rPr>
+              <a:t>b</a:t>
+            </a:r>
+            <a:r>
+              <a:rPr lang="zh-CN" altLang="en-US" sz="1200" dirty="0" smtClean="0">
+                <a:latin typeface="微软雅黑" panose="020B0503020204020204" pitchFamily="34" charset="-122"/>
+                <a:ea typeface="微软雅黑" panose="020B0503020204020204" pitchFamily="34" charset="-122"/>
+              </a:rPr>
+              <a:t>中无匹配的记录则填写为</a:t>
+            </a:r>
+            <a:r>
+              <a:rPr lang="en-US" altLang="zh-CN" sz="1200" dirty="0" smtClean="0">
+                <a:latin typeface="微软雅黑" panose="020B0503020204020204" pitchFamily="34" charset="-122"/>
+                <a:ea typeface="微软雅黑" panose="020B0503020204020204" pitchFamily="34" charset="-122"/>
+              </a:rPr>
+              <a:t>NULL</a:t>
+            </a:r>
+            <a:endParaRPr lang="en-US" altLang="zh-CN" sz="1200" dirty="0">
+              <a:solidFill>
+                <a:srgbClr val="FFFF00"/>
+              </a:solidFill>
+            </a:endParaRPr>
+          </a:p>
+        </p:txBody>
+      </p:sp>
+      <p:sp>
+        <p:nvSpPr>
+          <p:cNvPr id="10" name="矩形标注 9"/>
+          <p:cNvSpPr/>
+          <p:nvPr/>
+        </p:nvSpPr>
+        <p:spPr>
+          <a:xfrm>
+            <a:off x="9682178" y="1727013"/>
+            <a:ext cx="2509822" cy="534856"/>
+          </a:xfrm>
+          <a:prstGeom prst="wedgeRectCallout">
+            <a:avLst>
+              <a:gd name="adj1" fmla="val -63141"/>
+              <a:gd name="adj2" fmla="val -15694"/>
+            </a:avLst>
+          </a:prstGeom>
+          <a:solidFill>
+            <a:schemeClr val="tx1">
+              <a:lumMod val="85000"/>
+              <a:alpha val="50000"/>
+            </a:schemeClr>
+          </a:solidFill>
+          <a:ln>
+            <a:noFill/>
+          </a:ln>
+        </p:spPr>
+        <p:style>
+          <a:lnRef idx="0">
+            <a:scrgbClr r="0" g="0" b="0"/>
+          </a:lnRef>
+          <a:fillRef idx="0">
+            <a:scrgbClr r="0" g="0" b="0"/>
+          </a:fillRef>
+          <a:effectRef idx="0">
+            <a:scrgbClr r="0" g="0" b="0"/>
+          </a:effectRef>
+          <a:fontRef idx="minor">
+            <a:schemeClr val="lt1"/>
+          </a:fontRef>
+        </p:style>
+        <p:txBody>
+          <a:bodyPr rtlCol="0" anchor="ctr"/>
+          <a:lstStyle/>
+          <a:p>
+            <a:r>
+              <a:rPr lang="zh-CN" altLang="en-US" sz="1200" dirty="0" smtClean="0">
+                <a:latin typeface="微软雅黑" panose="020B0503020204020204" pitchFamily="34" charset="-122"/>
+                <a:ea typeface="微软雅黑" panose="020B0503020204020204" pitchFamily="34" charset="-122"/>
+              </a:rPr>
+              <a:t>把条件写在</a:t>
+            </a:r>
+            <a:r>
+              <a:rPr lang="en-US" altLang="zh-CN" sz="1200" dirty="0" smtClean="0">
+                <a:latin typeface="微软雅黑" panose="020B0503020204020204" pitchFamily="34" charset="-122"/>
+                <a:ea typeface="微软雅黑" panose="020B0503020204020204" pitchFamily="34" charset="-122"/>
+              </a:rPr>
+              <a:t>where</a:t>
+            </a:r>
+            <a:r>
+              <a:rPr lang="zh-CN" altLang="en-US" sz="1200" dirty="0" smtClean="0">
+                <a:latin typeface="微软雅黑" panose="020B0503020204020204" pitchFamily="34" charset="-122"/>
+                <a:ea typeface="微软雅黑" panose="020B0503020204020204" pitchFamily="34" charset="-122"/>
+              </a:rPr>
+              <a:t>中，可以用</a:t>
+            </a:r>
+            <a:r>
+              <a:rPr lang="en-US" altLang="zh-CN" sz="1200" dirty="0" smtClean="0">
+                <a:latin typeface="微软雅黑" panose="020B0503020204020204" pitchFamily="34" charset="-122"/>
+                <a:ea typeface="微软雅黑" panose="020B0503020204020204" pitchFamily="34" charset="-122"/>
+              </a:rPr>
+              <a:t>where</a:t>
+            </a:r>
+            <a:r>
+              <a:rPr lang="zh-CN" altLang="en-US" sz="1200" dirty="0" smtClean="0">
+                <a:latin typeface="微软雅黑" panose="020B0503020204020204" pitchFamily="34" charset="-122"/>
+                <a:ea typeface="微软雅黑" panose="020B0503020204020204" pitchFamily="34" charset="-122"/>
+              </a:rPr>
+              <a:t>过滤出不满足的</a:t>
+            </a:r>
+            <a:r>
+              <a:rPr lang="en-US" altLang="zh-CN" sz="1200" dirty="0" smtClean="0">
+                <a:latin typeface="微软雅黑" panose="020B0503020204020204" pitchFamily="34" charset="-122"/>
+                <a:ea typeface="微软雅黑" panose="020B0503020204020204" pitchFamily="34" charset="-122"/>
+              </a:rPr>
+              <a:t>a</a:t>
+            </a:r>
+            <a:r>
+              <a:rPr lang="zh-CN" altLang="en-US" sz="1200" dirty="0" smtClean="0">
+                <a:latin typeface="微软雅黑" panose="020B0503020204020204" pitchFamily="34" charset="-122"/>
+                <a:ea typeface="微软雅黑" panose="020B0503020204020204" pitchFamily="34" charset="-122"/>
+              </a:rPr>
+              <a:t>的记录</a:t>
+            </a:r>
+            <a:endParaRPr lang="en-US" altLang="zh-CN" sz="1200" dirty="0">
+              <a:solidFill>
+                <a:srgbClr val="FFFF00"/>
+              </a:solidFill>
+            </a:endParaRPr>
+          </a:p>
+        </p:txBody>
+      </p:sp>
+      <p:sp>
+        <p:nvSpPr>
+          <p:cNvPr id="12" name="矩形标注 11"/>
+          <p:cNvSpPr/>
+          <p:nvPr/>
+        </p:nvSpPr>
+        <p:spPr>
+          <a:xfrm>
+            <a:off x="5388694" y="1539671"/>
+            <a:ext cx="2509822" cy="784306"/>
+          </a:xfrm>
+          <a:prstGeom prst="wedgeRectCallout">
+            <a:avLst>
+              <a:gd name="adj1" fmla="val -76033"/>
+              <a:gd name="adj2" fmla="val 57951"/>
+            </a:avLst>
+          </a:prstGeom>
+          <a:solidFill>
+            <a:schemeClr val="tx1">
+              <a:lumMod val="85000"/>
+              <a:alpha val="50000"/>
+            </a:schemeClr>
+          </a:solidFill>
+          <a:ln>
+            <a:noFill/>
+          </a:ln>
+        </p:spPr>
+        <p:style>
+          <a:lnRef idx="0">
+            <a:scrgbClr r="0" g="0" b="0"/>
+          </a:lnRef>
+          <a:fillRef idx="0">
+            <a:scrgbClr r="0" g="0" b="0"/>
+          </a:fillRef>
+          <a:effectRef idx="0">
+            <a:scrgbClr r="0" g="0" b="0"/>
+          </a:effectRef>
+          <a:fontRef idx="minor">
+            <a:schemeClr val="lt1"/>
+          </a:fontRef>
+        </p:style>
+        <p:txBody>
+          <a:bodyPr rtlCol="0" anchor="ctr"/>
+          <a:lstStyle/>
+          <a:p>
+            <a:r>
+              <a:rPr lang="zh-CN" altLang="en-US" sz="1200" dirty="0" smtClean="0">
+                <a:solidFill>
+                  <a:schemeClr val="tx1"/>
+                </a:solidFill>
+                <a:latin typeface="微软雅黑" panose="020B0503020204020204" pitchFamily="34" charset="-122"/>
+                <a:ea typeface="微软雅黑" panose="020B0503020204020204" pitchFamily="34" charset="-122"/>
+              </a:rPr>
+              <a:t>把条件写在</a:t>
+            </a:r>
+            <a:r>
+              <a:rPr lang="en-US" altLang="zh-CN" sz="1200" dirty="0" smtClean="0">
+                <a:solidFill>
+                  <a:schemeClr val="tx1"/>
+                </a:solidFill>
+                <a:latin typeface="微软雅黑" panose="020B0503020204020204" pitchFamily="34" charset="-122"/>
+                <a:ea typeface="微软雅黑" panose="020B0503020204020204" pitchFamily="34" charset="-122"/>
+              </a:rPr>
+              <a:t>where</a:t>
+            </a:r>
+            <a:r>
+              <a:rPr lang="zh-CN" altLang="en-US" sz="1200" dirty="0" smtClean="0">
+                <a:solidFill>
+                  <a:schemeClr val="tx1"/>
+                </a:solidFill>
+                <a:latin typeface="微软雅黑" panose="020B0503020204020204" pitchFamily="34" charset="-122"/>
+                <a:ea typeface="微软雅黑" panose="020B0503020204020204" pitchFamily="34" charset="-122"/>
+              </a:rPr>
+              <a:t>中，驱动表是表</a:t>
+            </a:r>
+            <a:r>
+              <a:rPr lang="en-US" altLang="zh-CN" sz="1200" dirty="0" smtClean="0">
+                <a:solidFill>
+                  <a:schemeClr val="tx1"/>
+                </a:solidFill>
+                <a:latin typeface="微软雅黑" panose="020B0503020204020204" pitchFamily="34" charset="-122"/>
+                <a:ea typeface="微软雅黑" panose="020B0503020204020204" pitchFamily="34" charset="-122"/>
+              </a:rPr>
+              <a:t>b</a:t>
+            </a:r>
+            <a:r>
+              <a:rPr lang="zh-CN" altLang="en-US" sz="1200" dirty="0" smtClean="0">
+                <a:solidFill>
+                  <a:schemeClr val="tx1"/>
+                </a:solidFill>
+                <a:latin typeface="微软雅黑" panose="020B0503020204020204" pitchFamily="34" charset="-122"/>
+                <a:ea typeface="微软雅黑" panose="020B0503020204020204" pitchFamily="34" charset="-122"/>
+              </a:rPr>
+              <a:t>，被驱动表是</a:t>
+            </a:r>
+            <a:r>
+              <a:rPr lang="en-US" altLang="zh-CN" sz="1200" dirty="0" smtClean="0">
+                <a:solidFill>
+                  <a:schemeClr val="tx1"/>
+                </a:solidFill>
+                <a:latin typeface="微软雅黑" panose="020B0503020204020204" pitchFamily="34" charset="-122"/>
+                <a:ea typeface="微软雅黑" panose="020B0503020204020204" pitchFamily="34" charset="-122"/>
+              </a:rPr>
+              <a:t>a</a:t>
+            </a:r>
+            <a:r>
+              <a:rPr lang="zh-CN" altLang="en-US" sz="1200" dirty="0" smtClean="0">
+                <a:solidFill>
+                  <a:schemeClr val="tx1"/>
+                </a:solidFill>
+                <a:latin typeface="微软雅黑" panose="020B0503020204020204" pitchFamily="34" charset="-122"/>
+                <a:ea typeface="微软雅黑" panose="020B0503020204020204" pitchFamily="34" charset="-122"/>
+              </a:rPr>
+              <a:t>，</a:t>
+            </a:r>
+            <a:r>
+              <a:rPr lang="en-US" altLang="zh-CN" sz="1200" dirty="0" smtClean="0">
+                <a:solidFill>
+                  <a:schemeClr val="tx1"/>
+                </a:solidFill>
+                <a:latin typeface="微软雅黑" panose="020B0503020204020204" pitchFamily="34" charset="-122"/>
+                <a:ea typeface="微软雅黑" panose="020B0503020204020204" pitchFamily="34" charset="-122"/>
+              </a:rPr>
+              <a:t>where</a:t>
+            </a:r>
+            <a:r>
+              <a:rPr lang="zh-CN" altLang="en-US" sz="1200" dirty="0" smtClean="0">
+                <a:solidFill>
+                  <a:schemeClr val="tx1"/>
+                </a:solidFill>
+                <a:latin typeface="微软雅黑" panose="020B0503020204020204" pitchFamily="34" charset="-122"/>
+                <a:ea typeface="微软雅黑" panose="020B0503020204020204" pitchFamily="34" charset="-122"/>
+              </a:rPr>
+              <a:t>中什么都没写，表示用了</a:t>
+            </a:r>
+            <a:r>
+              <a:rPr lang="en-US" altLang="zh-CN" sz="1200" dirty="0" smtClean="0">
+                <a:solidFill>
+                  <a:schemeClr val="tx1"/>
+                </a:solidFill>
+                <a:latin typeface="微软雅黑" panose="020B0503020204020204" pitchFamily="34" charset="-122"/>
+                <a:ea typeface="微软雅黑" panose="020B0503020204020204" pitchFamily="34" charset="-122"/>
+              </a:rPr>
+              <a:t>Index Nested-Loop Join</a:t>
+            </a:r>
+            <a:r>
+              <a:rPr lang="zh-CN" altLang="en-US" sz="1200" dirty="0" smtClean="0">
+                <a:solidFill>
+                  <a:schemeClr val="tx1"/>
+                </a:solidFill>
+                <a:latin typeface="微软雅黑" panose="020B0503020204020204" pitchFamily="34" charset="-122"/>
+                <a:ea typeface="微软雅黑" panose="020B0503020204020204" pitchFamily="34" charset="-122"/>
+              </a:rPr>
+              <a:t>算法</a:t>
+            </a:r>
+            <a:endParaRPr lang="en-US" altLang="zh-CN" sz="1200" dirty="0" smtClean="0">
+              <a:solidFill>
+                <a:schemeClr val="tx1"/>
+              </a:solidFill>
+              <a:latin typeface="微软雅黑" panose="020B0503020204020204" pitchFamily="34" charset="-122"/>
+              <a:ea typeface="微软雅黑" panose="020B0503020204020204" pitchFamily="34" charset="-122"/>
+            </a:endParaRPr>
+          </a:p>
+        </p:txBody>
+      </p:sp>
+      <p:pic>
+        <p:nvPicPr>
+          <p:cNvPr id="6" name="图片 5"/>
+          <p:cNvPicPr>
+            <a:picLocks noChangeAspect="1"/>
+          </p:cNvPicPr>
+          <p:nvPr/>
+        </p:nvPicPr>
+        <p:blipFill>
+          <a:blip r:embed="rId4" cstate="print">
+            <a:extLst>
+              <a:ext uri="{28A0092B-C50C-407E-A947-70E740481C1C}">
+                <a14:useLocalDpi xmlns:a14="http://schemas.microsoft.com/office/drawing/2010/main" val="0"/>
+              </a:ext>
+            </a:extLst>
+          </a:blip>
+          <a:stretch>
+            <a:fillRect/>
+          </a:stretch>
+        </p:blipFill>
+        <p:spPr>
+          <a:xfrm>
+            <a:off x="182003" y="2435670"/>
+            <a:ext cx="10755086" cy="1522164"/>
+          </a:xfrm>
+          <a:prstGeom prst="rect">
+            <a:avLst/>
+          </a:prstGeom>
+        </p:spPr>
+      </p:pic>
+      <p:sp>
+        <p:nvSpPr>
+          <p:cNvPr id="17" name="矩形 16"/>
+          <p:cNvSpPr/>
+          <p:nvPr/>
+        </p:nvSpPr>
+        <p:spPr>
+          <a:xfrm>
+            <a:off x="715591" y="4560176"/>
+            <a:ext cx="11856027" cy="307777"/>
+          </a:xfrm>
+          <a:prstGeom prst="rect">
+            <a:avLst/>
+          </a:prstGeom>
+        </p:spPr>
+        <p:txBody>
+          <a:bodyPr wrap="square">
+            <a:spAutoFit/>
+          </a:bodyPr>
+          <a:lstStyle/>
+          <a:p>
+            <a:r>
+              <a:rPr lang="zh-CN" altLang="en-US" sz="1400" dirty="0" smtClean="0">
+                <a:solidFill>
+                  <a:srgbClr val="FFFF00"/>
+                </a:solidFill>
+                <a:latin typeface="微软雅黑" panose="020B0503020204020204" pitchFamily="34" charset="-122"/>
+                <a:ea typeface="微软雅黑" panose="020B0503020204020204" pitchFamily="34" charset="-122"/>
+              </a:rPr>
+              <a:t>顺序扫描表</a:t>
+            </a:r>
+            <a:r>
+              <a:rPr lang="en-US" altLang="zh-CN" sz="1400" dirty="0" smtClean="0">
+                <a:solidFill>
+                  <a:srgbClr val="FFFF00"/>
+                </a:solidFill>
+                <a:latin typeface="微软雅黑" panose="020B0503020204020204" pitchFamily="34" charset="-122"/>
+                <a:ea typeface="微软雅黑" panose="020B0503020204020204" pitchFamily="34" charset="-122"/>
+              </a:rPr>
+              <a:t>b</a:t>
+            </a:r>
+            <a:r>
+              <a:rPr lang="zh-CN" altLang="en-US" sz="1400" dirty="0" smtClean="0">
+                <a:solidFill>
+                  <a:srgbClr val="FFFF00"/>
+                </a:solidFill>
+                <a:latin typeface="微软雅黑" panose="020B0503020204020204" pitchFamily="34" charset="-122"/>
+                <a:ea typeface="微软雅黑" panose="020B0503020204020204" pitchFamily="34" charset="-122"/>
+              </a:rPr>
+              <a:t>，每一行用</a:t>
+            </a:r>
+            <a:r>
+              <a:rPr lang="en-US" altLang="zh-CN" sz="1400" dirty="0" smtClean="0">
+                <a:solidFill>
+                  <a:srgbClr val="FFFF00"/>
+                </a:solidFill>
+                <a:latin typeface="微软雅黑" panose="020B0503020204020204" pitchFamily="34" charset="-122"/>
+                <a:ea typeface="微软雅黑" panose="020B0503020204020204" pitchFamily="34" charset="-122"/>
+              </a:rPr>
+              <a:t>b.f1</a:t>
+            </a:r>
+            <a:r>
+              <a:rPr lang="zh-CN" altLang="en-US" sz="1400" dirty="0" smtClean="0">
+                <a:solidFill>
+                  <a:srgbClr val="FFFF00"/>
+                </a:solidFill>
+                <a:latin typeface="微软雅黑" panose="020B0503020204020204" pitchFamily="34" charset="-122"/>
+                <a:ea typeface="微软雅黑" panose="020B0503020204020204" pitchFamily="34" charset="-122"/>
+              </a:rPr>
+              <a:t>到表</a:t>
+            </a:r>
+            <a:r>
+              <a:rPr lang="en-US" altLang="zh-CN" sz="1400" dirty="0" smtClean="0">
+                <a:solidFill>
+                  <a:srgbClr val="FFFF00"/>
+                </a:solidFill>
+                <a:latin typeface="微软雅黑" panose="020B0503020204020204" pitchFamily="34" charset="-122"/>
+                <a:ea typeface="微软雅黑" panose="020B0503020204020204" pitchFamily="34" charset="-122"/>
+              </a:rPr>
+              <a:t>a</a:t>
+            </a:r>
+            <a:r>
+              <a:rPr lang="zh-CN" altLang="en-US" sz="1400" dirty="0" smtClean="0">
+                <a:solidFill>
+                  <a:srgbClr val="FFFF00"/>
+                </a:solidFill>
+                <a:latin typeface="微软雅黑" panose="020B0503020204020204" pitchFamily="34" charset="-122"/>
+                <a:ea typeface="微软雅黑" panose="020B0503020204020204" pitchFamily="34" charset="-122"/>
+              </a:rPr>
+              <a:t>中去查，匹配到记录后，判断</a:t>
+            </a:r>
+            <a:r>
+              <a:rPr lang="en-US" altLang="zh-CN" sz="1400" dirty="0" smtClean="0">
+                <a:solidFill>
+                  <a:srgbClr val="FFFF00"/>
+                </a:solidFill>
+                <a:latin typeface="微软雅黑" panose="020B0503020204020204" pitchFamily="34" charset="-122"/>
+                <a:ea typeface="微软雅黑" panose="020B0503020204020204" pitchFamily="34" charset="-122"/>
+              </a:rPr>
+              <a:t>a.f2=b.f2</a:t>
+            </a:r>
+            <a:r>
+              <a:rPr lang="zh-CN" altLang="en-US" sz="1400" dirty="0" smtClean="0">
+                <a:solidFill>
+                  <a:srgbClr val="FFFF00"/>
+                </a:solidFill>
+                <a:latin typeface="微软雅黑" panose="020B0503020204020204" pitchFamily="34" charset="-122"/>
+                <a:ea typeface="微软雅黑" panose="020B0503020204020204" pitchFamily="34" charset="-122"/>
+              </a:rPr>
+              <a:t>是否满足，满足的话就作为结果集一部分。</a:t>
+            </a:r>
+            <a:endParaRPr lang="en-US" altLang="zh-CN" sz="1400" dirty="0">
+              <a:solidFill>
+                <a:srgbClr val="FFFF00"/>
+              </a:solidFill>
+              <a:latin typeface="微软雅黑" panose="020B0503020204020204" pitchFamily="34" charset="-122"/>
+              <a:ea typeface="微软雅黑" panose="020B0503020204020204" pitchFamily="34" charset="-122"/>
+            </a:endParaRPr>
+          </a:p>
+        </p:txBody>
+      </p:sp>
+      <p:sp>
+        <p:nvSpPr>
+          <p:cNvPr id="18" name="矩形 17"/>
+          <p:cNvSpPr/>
+          <p:nvPr/>
+        </p:nvSpPr>
+        <p:spPr>
+          <a:xfrm>
+            <a:off x="715590" y="5513453"/>
+            <a:ext cx="11856027" cy="738664"/>
+          </a:xfrm>
+          <a:prstGeom prst="rect">
+            <a:avLst/>
+          </a:prstGeom>
+        </p:spPr>
+        <p:txBody>
+          <a:bodyPr wrap="square">
+            <a:spAutoFit/>
+          </a:bodyPr>
+          <a:lstStyle/>
+          <a:p>
+            <a:r>
+              <a:rPr lang="zh-CN" altLang="en-US" sz="1400" dirty="0" smtClean="0">
+                <a:solidFill>
+                  <a:srgbClr val="FFFF00"/>
+                </a:solidFill>
+                <a:latin typeface="微软雅黑" panose="020B0503020204020204" pitchFamily="34" charset="-122"/>
+                <a:ea typeface="微软雅黑" panose="020B0503020204020204" pitchFamily="34" charset="-122"/>
+              </a:rPr>
+              <a:t>使用</a:t>
+            </a:r>
+            <a:r>
+              <a:rPr lang="en-US" altLang="zh-CN" sz="1400" dirty="0" smtClean="0">
+                <a:solidFill>
+                  <a:srgbClr val="FFFF00"/>
+                </a:solidFill>
+                <a:latin typeface="微软雅黑" panose="020B0503020204020204" pitchFamily="34" charset="-122"/>
+                <a:ea typeface="微软雅黑" panose="020B0503020204020204" pitchFamily="34" charset="-122"/>
+              </a:rPr>
+              <a:t>left join</a:t>
+            </a:r>
+            <a:r>
+              <a:rPr lang="zh-CN" altLang="en-US" sz="1400" dirty="0" smtClean="0">
+                <a:solidFill>
+                  <a:srgbClr val="FFFF00"/>
+                </a:solidFill>
+                <a:latin typeface="微软雅黑" panose="020B0503020204020204" pitchFamily="34" charset="-122"/>
+                <a:ea typeface="微软雅黑" panose="020B0503020204020204" pitchFamily="34" charset="-122"/>
+              </a:rPr>
+              <a:t>时，左边的表不一定是驱动表</a:t>
+            </a:r>
+            <a:endParaRPr lang="en-US" altLang="zh-CN" sz="1400" dirty="0" smtClean="0">
+              <a:solidFill>
+                <a:srgbClr val="FFFF00"/>
+              </a:solidFill>
+              <a:latin typeface="微软雅黑" panose="020B0503020204020204" pitchFamily="34" charset="-122"/>
+              <a:ea typeface="微软雅黑" panose="020B0503020204020204" pitchFamily="34" charset="-122"/>
+            </a:endParaRPr>
+          </a:p>
+          <a:p>
+            <a:r>
+              <a:rPr lang="zh-CN" altLang="en-US" sz="1400" dirty="0" smtClean="0">
+                <a:solidFill>
+                  <a:srgbClr val="FFFF00"/>
+                </a:solidFill>
+                <a:latin typeface="微软雅黑" panose="020B0503020204020204" pitchFamily="34" charset="-122"/>
+                <a:ea typeface="微软雅黑" panose="020B0503020204020204" pitchFamily="34" charset="-122"/>
+              </a:rPr>
+              <a:t>如果需要</a:t>
+            </a:r>
+            <a:r>
+              <a:rPr lang="en-US" altLang="zh-CN" sz="1400" dirty="0" smtClean="0">
+                <a:solidFill>
+                  <a:srgbClr val="FFFF00"/>
+                </a:solidFill>
+                <a:latin typeface="微软雅黑" panose="020B0503020204020204" pitchFamily="34" charset="-122"/>
+                <a:ea typeface="微软雅黑" panose="020B0503020204020204" pitchFamily="34" charset="-122"/>
+              </a:rPr>
+              <a:t>left join</a:t>
+            </a:r>
+            <a:r>
+              <a:rPr lang="zh-CN" altLang="en-US" sz="1400" dirty="0" smtClean="0">
+                <a:solidFill>
+                  <a:srgbClr val="FFFF00"/>
+                </a:solidFill>
+                <a:latin typeface="微软雅黑" panose="020B0503020204020204" pitchFamily="34" charset="-122"/>
+                <a:ea typeface="微软雅黑" panose="020B0503020204020204" pitchFamily="34" charset="-122"/>
+              </a:rPr>
+              <a:t>的语义，就不能把被驱动表的字段放在</a:t>
+            </a:r>
+            <a:r>
+              <a:rPr lang="en-US" altLang="zh-CN" sz="1400" dirty="0" smtClean="0">
+                <a:solidFill>
+                  <a:srgbClr val="FFFF00"/>
+                </a:solidFill>
+                <a:latin typeface="微软雅黑" panose="020B0503020204020204" pitchFamily="34" charset="-122"/>
+                <a:ea typeface="微软雅黑" panose="020B0503020204020204" pitchFamily="34" charset="-122"/>
+              </a:rPr>
+              <a:t>where</a:t>
+            </a:r>
+            <a:r>
+              <a:rPr lang="zh-CN" altLang="en-US" sz="1400" dirty="0" smtClean="0">
+                <a:solidFill>
+                  <a:srgbClr val="FFFF00"/>
+                </a:solidFill>
+                <a:latin typeface="微软雅黑" panose="020B0503020204020204" pitchFamily="34" charset="-122"/>
+                <a:ea typeface="微软雅黑" panose="020B0503020204020204" pitchFamily="34" charset="-122"/>
+              </a:rPr>
+              <a:t>条件里面做等值判断或不等值判断，必须都写在</a:t>
+            </a:r>
+            <a:r>
+              <a:rPr lang="en-US" altLang="zh-CN" sz="1400" dirty="0" smtClean="0">
+                <a:solidFill>
+                  <a:srgbClr val="FFFF00"/>
+                </a:solidFill>
+                <a:latin typeface="微软雅黑" panose="020B0503020204020204" pitchFamily="34" charset="-122"/>
+                <a:ea typeface="微软雅黑" panose="020B0503020204020204" pitchFamily="34" charset="-122"/>
+              </a:rPr>
+              <a:t>on</a:t>
+            </a:r>
+            <a:r>
+              <a:rPr lang="zh-CN" altLang="en-US" sz="1400" dirty="0" smtClean="0">
+                <a:solidFill>
+                  <a:srgbClr val="FFFF00"/>
+                </a:solidFill>
+                <a:latin typeface="微软雅黑" panose="020B0503020204020204" pitchFamily="34" charset="-122"/>
+                <a:ea typeface="微软雅黑" panose="020B0503020204020204" pitchFamily="34" charset="-122"/>
+              </a:rPr>
+              <a:t>里面。</a:t>
+            </a:r>
+            <a:endParaRPr lang="en-US" altLang="zh-CN" sz="1400" dirty="0" smtClean="0">
+              <a:solidFill>
+                <a:srgbClr val="FFFF00"/>
+              </a:solidFill>
+              <a:latin typeface="微软雅黑" panose="020B0503020204020204" pitchFamily="34" charset="-122"/>
+              <a:ea typeface="微软雅黑" panose="020B0503020204020204" pitchFamily="34" charset="-122"/>
+            </a:endParaRPr>
+          </a:p>
+          <a:p>
+            <a:r>
+              <a:rPr lang="zh-CN" altLang="en-US" sz="1400" dirty="0" smtClean="0">
+                <a:solidFill>
+                  <a:srgbClr val="FFFF00"/>
+                </a:solidFill>
+                <a:latin typeface="微软雅黑" panose="020B0503020204020204" pitchFamily="34" charset="-122"/>
+                <a:ea typeface="微软雅黑" panose="020B0503020204020204" pitchFamily="34" charset="-122"/>
+              </a:rPr>
+              <a:t>而不用</a:t>
+            </a:r>
+            <a:r>
+              <a:rPr lang="en-US" altLang="zh-CN" sz="1400" dirty="0" smtClean="0">
+                <a:solidFill>
+                  <a:srgbClr val="FFFF00"/>
+                </a:solidFill>
+                <a:latin typeface="微软雅黑" panose="020B0503020204020204" pitchFamily="34" charset="-122"/>
+                <a:ea typeface="微软雅黑" panose="020B0503020204020204" pitchFamily="34" charset="-122"/>
+              </a:rPr>
+              <a:t>left join</a:t>
+            </a:r>
+            <a:r>
+              <a:rPr lang="zh-CN" altLang="en-US" sz="1400" dirty="0" smtClean="0">
+                <a:solidFill>
+                  <a:srgbClr val="FFFF00"/>
+                </a:solidFill>
+                <a:latin typeface="微软雅黑" panose="020B0503020204020204" pitchFamily="34" charset="-122"/>
+                <a:ea typeface="微软雅黑" panose="020B0503020204020204" pitchFamily="34" charset="-122"/>
+              </a:rPr>
+              <a:t>改用</a:t>
+            </a:r>
+            <a:r>
+              <a:rPr lang="en-US" altLang="zh-CN" sz="1400" dirty="0" smtClean="0">
+                <a:solidFill>
+                  <a:srgbClr val="FFFF00"/>
+                </a:solidFill>
+                <a:latin typeface="微软雅黑" panose="020B0503020204020204" pitchFamily="34" charset="-122"/>
+                <a:ea typeface="微软雅黑" panose="020B0503020204020204" pitchFamily="34" charset="-122"/>
+              </a:rPr>
+              <a:t>join</a:t>
+            </a:r>
+            <a:r>
+              <a:rPr lang="zh-CN" altLang="en-US" sz="1400" dirty="0" smtClean="0">
+                <a:solidFill>
+                  <a:srgbClr val="FFFF00"/>
+                </a:solidFill>
+                <a:latin typeface="微软雅黑" panose="020B0503020204020204" pitchFamily="34" charset="-122"/>
+                <a:ea typeface="微软雅黑" panose="020B0503020204020204" pitchFamily="34" charset="-122"/>
+              </a:rPr>
+              <a:t>，被优化器优化成全部条件写在</a:t>
+            </a:r>
+            <a:r>
+              <a:rPr lang="en-US" altLang="zh-CN" sz="1400" dirty="0" smtClean="0">
+                <a:solidFill>
+                  <a:srgbClr val="FFFF00"/>
+                </a:solidFill>
+                <a:latin typeface="微软雅黑" panose="020B0503020204020204" pitchFamily="34" charset="-122"/>
+                <a:ea typeface="微软雅黑" panose="020B0503020204020204" pitchFamily="34" charset="-122"/>
+              </a:rPr>
+              <a:t>where</a:t>
+            </a:r>
+            <a:r>
+              <a:rPr lang="zh-CN" altLang="en-US" sz="1400" dirty="0" smtClean="0">
+                <a:solidFill>
+                  <a:srgbClr val="FFFF00"/>
+                </a:solidFill>
+                <a:latin typeface="微软雅黑" panose="020B0503020204020204" pitchFamily="34" charset="-122"/>
+                <a:ea typeface="微软雅黑" panose="020B0503020204020204" pitchFamily="34" charset="-122"/>
+              </a:rPr>
+              <a:t>中。</a:t>
+            </a:r>
+            <a:endParaRPr lang="en-US" altLang="zh-CN" sz="1400" dirty="0">
+              <a:solidFill>
+                <a:srgbClr val="FFFF00"/>
+              </a:solidFill>
+              <a:latin typeface="微软雅黑" panose="020B0503020204020204" pitchFamily="34" charset="-122"/>
+              <a:ea typeface="微软雅黑" panose="020B0503020204020204" pitchFamily="34" charset="-122"/>
+            </a:endParaRPr>
+          </a:p>
+        </p:txBody>
+      </p:sp>
+    </p:spTree>
+    <p:extLst>
+      <p:ext uri="{BB962C8B-B14F-4D97-AF65-F5344CB8AC3E}">
+        <p14:creationId xmlns:p14="http://schemas.microsoft.com/office/powerpoint/2010/main" val="3839903137"/>
       </p:ext>
     </p:extLst>
   </p:cSld>

</xml_diff>